<commit_message>
new figures and data
</commit_message>
<xml_diff>
--- a/figures/uDance-fig1.pptx
+++ b/figures/uDance-fig1.pptx
@@ -202,7 +202,7 @@
             <a:fld id="{92F0A2B9-8B59-D946-8677-FDFDD5EB5773}" type="datetimeFigureOut">
               <a:rPr lang="en-US" smtClean="0"/>
               <a:pPr/>
-              <a:t>7/7/22</a:t>
+              <a:t>12/16/22</a:t>
             </a:fld>
             <a:endParaRPr lang="en-US" dirty="0"/>
           </a:p>
@@ -694,7 +694,7 @@
           <a:p>
             <a:fld id="{C20C259A-A0B2-234E-89CC-2504E9EE6A63}" type="datetimeFigureOut">
               <a:rPr lang="en-US" smtClean="0"/>
-              <a:t>7/7/22</a:t>
+              <a:t>12/16/22</a:t>
             </a:fld>
             <a:endParaRPr lang="en-US"/>
           </a:p>
@@ -864,7 +864,7 @@
           <a:p>
             <a:fld id="{C20C259A-A0B2-234E-89CC-2504E9EE6A63}" type="datetimeFigureOut">
               <a:rPr lang="en-US" smtClean="0"/>
-              <a:t>7/7/22</a:t>
+              <a:t>12/16/22</a:t>
             </a:fld>
             <a:endParaRPr lang="en-US"/>
           </a:p>
@@ -1044,7 +1044,7 @@
           <a:p>
             <a:fld id="{C20C259A-A0B2-234E-89CC-2504E9EE6A63}" type="datetimeFigureOut">
               <a:rPr lang="en-US" smtClean="0"/>
-              <a:t>7/7/22</a:t>
+              <a:t>12/16/22</a:t>
             </a:fld>
             <a:endParaRPr lang="en-US"/>
           </a:p>
@@ -1214,7 +1214,7 @@
           <a:p>
             <a:fld id="{C20C259A-A0B2-234E-89CC-2504E9EE6A63}" type="datetimeFigureOut">
               <a:rPr lang="en-US" smtClean="0"/>
-              <a:t>7/7/22</a:t>
+              <a:t>12/16/22</a:t>
             </a:fld>
             <a:endParaRPr lang="en-US"/>
           </a:p>
@@ -1458,7 +1458,7 @@
           <a:p>
             <a:fld id="{C20C259A-A0B2-234E-89CC-2504E9EE6A63}" type="datetimeFigureOut">
               <a:rPr lang="en-US" smtClean="0"/>
-              <a:t>7/7/22</a:t>
+              <a:t>12/16/22</a:t>
             </a:fld>
             <a:endParaRPr lang="en-US"/>
           </a:p>
@@ -1690,7 +1690,7 @@
           <a:p>
             <a:fld id="{C20C259A-A0B2-234E-89CC-2504E9EE6A63}" type="datetimeFigureOut">
               <a:rPr lang="en-US" smtClean="0"/>
-              <a:t>7/7/22</a:t>
+              <a:t>12/16/22</a:t>
             </a:fld>
             <a:endParaRPr lang="en-US"/>
           </a:p>
@@ -2057,7 +2057,7 @@
           <a:p>
             <a:fld id="{C20C259A-A0B2-234E-89CC-2504E9EE6A63}" type="datetimeFigureOut">
               <a:rPr lang="en-US" smtClean="0"/>
-              <a:t>7/7/22</a:t>
+              <a:t>12/16/22</a:t>
             </a:fld>
             <a:endParaRPr lang="en-US"/>
           </a:p>
@@ -2175,7 +2175,7 @@
           <a:p>
             <a:fld id="{C20C259A-A0B2-234E-89CC-2504E9EE6A63}" type="datetimeFigureOut">
               <a:rPr lang="en-US" smtClean="0"/>
-              <a:t>7/7/22</a:t>
+              <a:t>12/16/22</a:t>
             </a:fld>
             <a:endParaRPr lang="en-US"/>
           </a:p>
@@ -2270,7 +2270,7 @@
           <a:p>
             <a:fld id="{C20C259A-A0B2-234E-89CC-2504E9EE6A63}" type="datetimeFigureOut">
               <a:rPr lang="en-US" smtClean="0"/>
-              <a:t>7/7/22</a:t>
+              <a:t>12/16/22</a:t>
             </a:fld>
             <a:endParaRPr lang="en-US"/>
           </a:p>
@@ -2547,7 +2547,7 @@
           <a:p>
             <a:fld id="{C20C259A-A0B2-234E-89CC-2504E9EE6A63}" type="datetimeFigureOut">
               <a:rPr lang="en-US" smtClean="0"/>
-              <a:t>7/7/22</a:t>
+              <a:t>12/16/22</a:t>
             </a:fld>
             <a:endParaRPr lang="en-US"/>
           </a:p>
@@ -2804,7 +2804,7 @@
           <a:p>
             <a:fld id="{C20C259A-A0B2-234E-89CC-2504E9EE6A63}" type="datetimeFigureOut">
               <a:rPr lang="en-US" smtClean="0"/>
-              <a:t>7/7/22</a:t>
+              <a:t>12/16/22</a:t>
             </a:fld>
             <a:endParaRPr lang="en-US"/>
           </a:p>
@@ -3018,7 +3018,7 @@
             <a:fld id="{C20C259A-A0B2-234E-89CC-2504E9EE6A63}" type="datetimeFigureOut">
               <a:rPr lang="en-US" smtClean="0"/>
               <a:pPr/>
-              <a:t>7/7/22</a:t>
+              <a:t>12/16/22</a:t>
             </a:fld>
             <a:endParaRPr lang="en-US" dirty="0"/>
           </a:p>
@@ -3477,136 +3477,6 @@
           <a:p>
             <a:pPr algn="ctr"/>
             <a:endParaRPr lang="en-US" dirty="0">
-              <a:latin typeface="Arial" panose="020B0604020202020204" pitchFamily="34" charset="0"/>
-            </a:endParaRPr>
-          </a:p>
-        </p:txBody>
-      </p:sp>
-      <p:sp>
-        <p:nvSpPr>
-          <p:cNvPr id="1400" name="Bent Arrow 1399">
-            <a:extLst>
-              <a:ext uri="{FF2B5EF4-FFF2-40B4-BE49-F238E27FC236}">
-                <a16:creationId xmlns:a16="http://schemas.microsoft.com/office/drawing/2014/main" id="{BCCA8ECC-574D-6E43-96EE-C98A72A3BD51}"/>
-              </a:ext>
-            </a:extLst>
-          </p:cNvPr>
-          <p:cNvSpPr/>
-          <p:nvPr/>
-        </p:nvSpPr>
-        <p:spPr>
-          <a:xfrm flipV="1">
-            <a:off x="759874" y="1843901"/>
-            <a:ext cx="111862" cy="87223"/>
-          </a:xfrm>
-          <a:prstGeom prst="bentArrow">
-            <a:avLst>
-              <a:gd name="adj1" fmla="val 25000"/>
-              <a:gd name="adj2" fmla="val 0"/>
-              <a:gd name="adj3" fmla="val 25000"/>
-              <a:gd name="adj4" fmla="val 43750"/>
-            </a:avLst>
-          </a:prstGeom>
-          <a:noFill/>
-          <a:ln w="50800" cap="rnd">
-            <a:solidFill>
-              <a:srgbClr val="C00000">
-                <a:alpha val="34000"/>
-              </a:srgbClr>
-            </a:solidFill>
-            <a:round/>
-          </a:ln>
-        </p:spPr>
-        <p:style>
-          <a:lnRef idx="2">
-            <a:schemeClr val="accent1">
-              <a:shade val="50000"/>
-            </a:schemeClr>
-          </a:lnRef>
-          <a:fillRef idx="1">
-            <a:schemeClr val="accent1"/>
-          </a:fillRef>
-          <a:effectRef idx="0">
-            <a:schemeClr val="accent1"/>
-          </a:effectRef>
-          <a:fontRef idx="minor">
-            <a:schemeClr val="lt1"/>
-          </a:fontRef>
-        </p:style>
-        <p:txBody>
-          <a:bodyPr rtlCol="0" anchor="ctr"/>
-          <a:lstStyle/>
-          <a:p>
-            <a:pPr algn="ctr"/>
-            <a:endParaRPr lang="en-US" dirty="0">
-              <a:solidFill>
-                <a:schemeClr val="tx1"/>
-              </a:solidFill>
-              <a:latin typeface="Arial" panose="020B0604020202020204" pitchFamily="34" charset="0"/>
-            </a:endParaRPr>
-          </a:p>
-        </p:txBody>
-      </p:sp>
-      <p:sp>
-        <p:nvSpPr>
-          <p:cNvPr id="1401" name="Bent Arrow 1400">
-            <a:extLst>
-              <a:ext uri="{FF2B5EF4-FFF2-40B4-BE49-F238E27FC236}">
-                <a16:creationId xmlns:a16="http://schemas.microsoft.com/office/drawing/2014/main" id="{9357DE55-0AE5-C244-9AE7-179CBDE053C9}"/>
-              </a:ext>
-            </a:extLst>
-          </p:cNvPr>
-          <p:cNvSpPr/>
-          <p:nvPr/>
-        </p:nvSpPr>
-        <p:spPr>
-          <a:xfrm>
-            <a:off x="3533210" y="1336233"/>
-            <a:ext cx="106538" cy="130320"/>
-          </a:xfrm>
-          <a:prstGeom prst="bentArrow">
-            <a:avLst>
-              <a:gd name="adj1" fmla="val 25000"/>
-              <a:gd name="adj2" fmla="val 0"/>
-              <a:gd name="adj3" fmla="val 25000"/>
-              <a:gd name="adj4" fmla="val 43750"/>
-            </a:avLst>
-          </a:prstGeom>
-          <a:noFill/>
-          <a:ln w="50800" cap="rnd">
-            <a:solidFill>
-              <a:srgbClr val="C00000">
-                <a:alpha val="29000"/>
-              </a:srgbClr>
-            </a:solidFill>
-            <a:round/>
-          </a:ln>
-        </p:spPr>
-        <p:style>
-          <a:lnRef idx="2">
-            <a:schemeClr val="accent1">
-              <a:shade val="50000"/>
-            </a:schemeClr>
-          </a:lnRef>
-          <a:fillRef idx="1">
-            <a:schemeClr val="accent1"/>
-          </a:fillRef>
-          <a:effectRef idx="0">
-            <a:schemeClr val="accent1"/>
-          </a:effectRef>
-          <a:fontRef idx="minor">
-            <a:schemeClr val="lt1"/>
-          </a:fontRef>
-        </p:style>
-        <p:txBody>
-          <a:bodyPr rtlCol="0" anchor="ctr"/>
-          <a:lstStyle/>
-          <a:p>
-            <a:pPr algn="ctr"/>
-            <a:endParaRPr lang="en-US" dirty="0">
-              <a:solidFill>
-                <a:schemeClr val="tx1"/>
-              </a:solidFill>
               <a:latin typeface="Arial" panose="020B0604020202020204" pitchFamily="34" charset="0"/>
             </a:endParaRPr>
           </a:p>
@@ -5360,7 +5230,7 @@
           <a:noFill/>
         </p:spPr>
         <p:txBody>
-          <a:bodyPr wrap="none" rtlCol="0">
+          <a:bodyPr wrap="square" rtlCol="0">
             <a:spAutoFit/>
           </a:bodyPr>
           <a:lstStyle/>
@@ -7802,7 +7672,7 @@
           <a:noFill/>
         </p:spPr>
         <p:txBody>
-          <a:bodyPr wrap="none" rtlCol="0">
+          <a:bodyPr wrap="square" rtlCol="0">
             <a:spAutoFit/>
           </a:bodyPr>
           <a:lstStyle/>
@@ -7886,7 +7756,7 @@
           <a:noFill/>
         </p:spPr>
         <p:txBody>
-          <a:bodyPr wrap="none" rtlCol="0">
+          <a:bodyPr wrap="square" rtlCol="0">
             <a:spAutoFit/>
           </a:bodyPr>
           <a:lstStyle/>
@@ -10114,7 +9984,7 @@
           <a:noFill/>
         </p:spPr>
         <p:txBody>
-          <a:bodyPr wrap="none" rtlCol="0">
+          <a:bodyPr wrap="square" rtlCol="0">
             <a:spAutoFit/>
           </a:bodyPr>
           <a:lstStyle/>
@@ -13627,7 +13497,7 @@
           <a:noFill/>
         </p:spPr>
         <p:txBody>
-          <a:bodyPr wrap="none" rtlCol="0">
+          <a:bodyPr wrap="square" rtlCol="0">
             <a:spAutoFit/>
           </a:bodyPr>
           <a:lstStyle/>
@@ -13665,7 +13535,7 @@
           <a:noFill/>
         </p:spPr>
         <p:txBody>
-          <a:bodyPr wrap="none" rtlCol="0">
+          <a:bodyPr wrap="square" rtlCol="0">
             <a:spAutoFit/>
           </a:bodyPr>
           <a:lstStyle/>
@@ -16640,7 +16510,7 @@
           <a:noFill/>
         </p:spPr>
         <p:txBody>
-          <a:bodyPr wrap="none" rtlCol="0">
+          <a:bodyPr wrap="square" rtlCol="0">
             <a:spAutoFit/>
           </a:bodyPr>
           <a:lstStyle/>
@@ -16678,7 +16548,7 @@
           <a:noFill/>
         </p:spPr>
         <p:txBody>
-          <a:bodyPr wrap="none" rtlCol="0">
+          <a:bodyPr wrap="square" rtlCol="0">
             <a:spAutoFit/>
           </a:bodyPr>
           <a:lstStyle/>
@@ -27501,12 +27371,2124 @@
           </p:txBody>
         </p:sp>
       </p:grpSp>
+      <p:sp>
+        <p:nvSpPr>
+          <p:cNvPr id="1727" name="Bent Arrow 1726">
+            <a:extLst>
+              <a:ext uri="{FF2B5EF4-FFF2-40B4-BE49-F238E27FC236}">
+                <a16:creationId xmlns:a16="http://schemas.microsoft.com/office/drawing/2014/main" id="{3B6C4D11-AF40-654E-90C5-6685E977A0F1}"/>
+              </a:ext>
+            </a:extLst>
+          </p:cNvPr>
+          <p:cNvSpPr/>
+          <p:nvPr/>
+        </p:nvSpPr>
+        <p:spPr>
+          <a:xfrm>
+            <a:off x="3074820" y="1049510"/>
+            <a:ext cx="621577" cy="428996"/>
+          </a:xfrm>
+          <a:prstGeom prst="bentArrow">
+            <a:avLst>
+              <a:gd name="adj1" fmla="val 0"/>
+              <a:gd name="adj2" fmla="val 0"/>
+              <a:gd name="adj3" fmla="val 25000"/>
+              <a:gd name="adj4" fmla="val 43750"/>
+            </a:avLst>
+          </a:prstGeom>
+          <a:ln>
+            <a:solidFill>
+              <a:srgbClr val="654D06"/>
+            </a:solidFill>
+          </a:ln>
+        </p:spPr>
+        <p:style>
+          <a:lnRef idx="2">
+            <a:schemeClr val="accent1">
+              <a:shade val="50000"/>
+            </a:schemeClr>
+          </a:lnRef>
+          <a:fillRef idx="1">
+            <a:schemeClr val="accent1"/>
+          </a:fillRef>
+          <a:effectRef idx="0">
+            <a:schemeClr val="accent1"/>
+          </a:effectRef>
+          <a:fontRef idx="minor">
+            <a:schemeClr val="lt1"/>
+          </a:fontRef>
+        </p:style>
+        <p:txBody>
+          <a:bodyPr rtlCol="0" anchor="ctr"/>
+          <a:lstStyle/>
+          <a:p>
+            <a:pPr algn="ctr"/>
+            <a:endParaRPr lang="en-US" dirty="0">
+              <a:solidFill>
+                <a:schemeClr val="tx1"/>
+              </a:solidFill>
+              <a:latin typeface="Arial" panose="020B0604020202020204" pitchFamily="34" charset="0"/>
+            </a:endParaRPr>
+          </a:p>
+        </p:txBody>
+      </p:sp>
+      <p:sp>
+        <p:nvSpPr>
+          <p:cNvPr id="1728" name="Bent Arrow 1727">
+            <a:extLst>
+              <a:ext uri="{FF2B5EF4-FFF2-40B4-BE49-F238E27FC236}">
+                <a16:creationId xmlns:a16="http://schemas.microsoft.com/office/drawing/2014/main" id="{B596DACF-A207-5447-A768-BCF6616D0574}"/>
+              </a:ext>
+            </a:extLst>
+          </p:cNvPr>
+          <p:cNvSpPr/>
+          <p:nvPr/>
+        </p:nvSpPr>
+        <p:spPr>
+          <a:xfrm flipV="1">
+            <a:off x="3074439" y="1473185"/>
+            <a:ext cx="176748" cy="457939"/>
+          </a:xfrm>
+          <a:prstGeom prst="bentArrow">
+            <a:avLst>
+              <a:gd name="adj1" fmla="val 25000"/>
+              <a:gd name="adj2" fmla="val 0"/>
+              <a:gd name="adj3" fmla="val 25000"/>
+              <a:gd name="adj4" fmla="val 43750"/>
+            </a:avLst>
+          </a:prstGeom>
+          <a:ln>
+            <a:solidFill>
+              <a:srgbClr val="654D06"/>
+            </a:solidFill>
+          </a:ln>
+        </p:spPr>
+        <p:style>
+          <a:lnRef idx="2">
+            <a:schemeClr val="accent1">
+              <a:shade val="50000"/>
+            </a:schemeClr>
+          </a:lnRef>
+          <a:fillRef idx="1">
+            <a:schemeClr val="accent1"/>
+          </a:fillRef>
+          <a:effectRef idx="0">
+            <a:schemeClr val="accent1"/>
+          </a:effectRef>
+          <a:fontRef idx="minor">
+            <a:schemeClr val="lt1"/>
+          </a:fontRef>
+        </p:style>
+        <p:txBody>
+          <a:bodyPr rtlCol="0" anchor="ctr"/>
+          <a:lstStyle/>
+          <a:p>
+            <a:pPr algn="ctr"/>
+            <a:endParaRPr lang="en-US" dirty="0">
+              <a:solidFill>
+                <a:schemeClr val="tx1"/>
+              </a:solidFill>
+              <a:latin typeface="Arial" panose="020B0604020202020204" pitchFamily="34" charset="0"/>
+            </a:endParaRPr>
+          </a:p>
+        </p:txBody>
+      </p:sp>
+      <p:sp>
+        <p:nvSpPr>
+          <p:cNvPr id="1729" name="Bent Arrow 1728">
+            <a:extLst>
+              <a:ext uri="{FF2B5EF4-FFF2-40B4-BE49-F238E27FC236}">
+                <a16:creationId xmlns:a16="http://schemas.microsoft.com/office/drawing/2014/main" id="{9A25387D-BFC7-2E44-98B2-E8F4BAA09E7A}"/>
+              </a:ext>
+            </a:extLst>
+          </p:cNvPr>
+          <p:cNvSpPr/>
+          <p:nvPr/>
+        </p:nvSpPr>
+        <p:spPr>
+          <a:xfrm>
+            <a:off x="3243739" y="1517232"/>
+            <a:ext cx="286467" cy="409540"/>
+          </a:xfrm>
+          <a:prstGeom prst="bentArrow">
+            <a:avLst>
+              <a:gd name="adj1" fmla="val 25000"/>
+              <a:gd name="adj2" fmla="val 0"/>
+              <a:gd name="adj3" fmla="val 25000"/>
+              <a:gd name="adj4" fmla="val 43750"/>
+            </a:avLst>
+          </a:prstGeom>
+          <a:ln>
+            <a:solidFill>
+              <a:srgbClr val="654D06"/>
+            </a:solidFill>
+          </a:ln>
+        </p:spPr>
+        <p:style>
+          <a:lnRef idx="2">
+            <a:schemeClr val="accent1">
+              <a:shade val="50000"/>
+            </a:schemeClr>
+          </a:lnRef>
+          <a:fillRef idx="1">
+            <a:schemeClr val="accent1"/>
+          </a:fillRef>
+          <a:effectRef idx="0">
+            <a:schemeClr val="accent1"/>
+          </a:effectRef>
+          <a:fontRef idx="minor">
+            <a:schemeClr val="lt1"/>
+          </a:fontRef>
+        </p:style>
+        <p:txBody>
+          <a:bodyPr rtlCol="0" anchor="ctr"/>
+          <a:lstStyle/>
+          <a:p>
+            <a:pPr algn="ctr"/>
+            <a:endParaRPr lang="en-US" dirty="0">
+              <a:solidFill>
+                <a:schemeClr val="tx1"/>
+              </a:solidFill>
+              <a:latin typeface="Arial" panose="020B0604020202020204" pitchFamily="34" charset="0"/>
+            </a:endParaRPr>
+          </a:p>
+        </p:txBody>
+      </p:sp>
+      <p:sp>
+        <p:nvSpPr>
+          <p:cNvPr id="1730" name="Bent Arrow 1729">
+            <a:extLst>
+              <a:ext uri="{FF2B5EF4-FFF2-40B4-BE49-F238E27FC236}">
+                <a16:creationId xmlns:a16="http://schemas.microsoft.com/office/drawing/2014/main" id="{181E32FE-30D9-8E4C-9AE6-083255B727C5}"/>
+              </a:ext>
+            </a:extLst>
+          </p:cNvPr>
+          <p:cNvSpPr/>
+          <p:nvPr/>
+        </p:nvSpPr>
+        <p:spPr>
+          <a:xfrm>
+            <a:off x="3696396" y="951802"/>
+            <a:ext cx="270906" cy="140986"/>
+          </a:xfrm>
+          <a:prstGeom prst="bentArrow">
+            <a:avLst>
+              <a:gd name="adj1" fmla="val 25000"/>
+              <a:gd name="adj2" fmla="val 0"/>
+              <a:gd name="adj3" fmla="val 25000"/>
+              <a:gd name="adj4" fmla="val 43750"/>
+            </a:avLst>
+          </a:prstGeom>
+          <a:ln>
+            <a:solidFill>
+              <a:srgbClr val="654D06"/>
+            </a:solidFill>
+          </a:ln>
+        </p:spPr>
+        <p:style>
+          <a:lnRef idx="2">
+            <a:schemeClr val="accent1">
+              <a:shade val="50000"/>
+            </a:schemeClr>
+          </a:lnRef>
+          <a:fillRef idx="1">
+            <a:schemeClr val="accent1"/>
+          </a:fillRef>
+          <a:effectRef idx="0">
+            <a:schemeClr val="accent1"/>
+          </a:effectRef>
+          <a:fontRef idx="minor">
+            <a:schemeClr val="lt1"/>
+          </a:fontRef>
+        </p:style>
+        <p:txBody>
+          <a:bodyPr rtlCol="0" anchor="ctr"/>
+          <a:lstStyle/>
+          <a:p>
+            <a:pPr algn="ctr"/>
+            <a:endParaRPr lang="en-US" dirty="0">
+              <a:solidFill>
+                <a:schemeClr val="tx1"/>
+              </a:solidFill>
+              <a:latin typeface="Arial" panose="020B0604020202020204" pitchFamily="34" charset="0"/>
+            </a:endParaRPr>
+          </a:p>
+        </p:txBody>
+      </p:sp>
+      <p:sp>
+        <p:nvSpPr>
+          <p:cNvPr id="1731" name="Bent Arrow 1730">
+            <a:extLst>
+              <a:ext uri="{FF2B5EF4-FFF2-40B4-BE49-F238E27FC236}">
+                <a16:creationId xmlns:a16="http://schemas.microsoft.com/office/drawing/2014/main" id="{51D977A3-B737-9740-8A51-A5BB29C4BCEA}"/>
+              </a:ext>
+            </a:extLst>
+          </p:cNvPr>
+          <p:cNvSpPr/>
+          <p:nvPr/>
+        </p:nvSpPr>
+        <p:spPr>
+          <a:xfrm flipV="1">
+            <a:off x="3696396" y="1049298"/>
+            <a:ext cx="357742" cy="123396"/>
+          </a:xfrm>
+          <a:prstGeom prst="bentArrow">
+            <a:avLst>
+              <a:gd name="adj1" fmla="val 25000"/>
+              <a:gd name="adj2" fmla="val 0"/>
+              <a:gd name="adj3" fmla="val 25000"/>
+              <a:gd name="adj4" fmla="val 43750"/>
+            </a:avLst>
+          </a:prstGeom>
+          <a:ln>
+            <a:solidFill>
+              <a:schemeClr val="accent1"/>
+            </a:solidFill>
+          </a:ln>
+        </p:spPr>
+        <p:style>
+          <a:lnRef idx="2">
+            <a:schemeClr val="accent1">
+              <a:shade val="50000"/>
+            </a:schemeClr>
+          </a:lnRef>
+          <a:fillRef idx="1">
+            <a:schemeClr val="accent1"/>
+          </a:fillRef>
+          <a:effectRef idx="0">
+            <a:schemeClr val="accent1"/>
+          </a:effectRef>
+          <a:fontRef idx="minor">
+            <a:schemeClr val="lt1"/>
+          </a:fontRef>
+        </p:style>
+        <p:txBody>
+          <a:bodyPr rtlCol="0" anchor="ctr"/>
+          <a:lstStyle/>
+          <a:p>
+            <a:pPr algn="ctr"/>
+            <a:endParaRPr lang="en-US" dirty="0">
+              <a:solidFill>
+                <a:schemeClr val="tx1"/>
+              </a:solidFill>
+              <a:latin typeface="Arial" panose="020B0604020202020204" pitchFamily="34" charset="0"/>
+            </a:endParaRPr>
+          </a:p>
+        </p:txBody>
+      </p:sp>
+      <p:sp>
+        <p:nvSpPr>
+          <p:cNvPr id="1732" name="Bent Arrow 1731">
+            <a:extLst>
+              <a:ext uri="{FF2B5EF4-FFF2-40B4-BE49-F238E27FC236}">
+                <a16:creationId xmlns:a16="http://schemas.microsoft.com/office/drawing/2014/main" id="{E10A032D-B2F7-A340-A486-DA82A944FBC6}"/>
+              </a:ext>
+            </a:extLst>
+          </p:cNvPr>
+          <p:cNvSpPr/>
+          <p:nvPr/>
+        </p:nvSpPr>
+        <p:spPr>
+          <a:xfrm>
+            <a:off x="3973349" y="838101"/>
+            <a:ext cx="222219" cy="140986"/>
+          </a:xfrm>
+          <a:prstGeom prst="bentArrow">
+            <a:avLst>
+              <a:gd name="adj1" fmla="val 25000"/>
+              <a:gd name="adj2" fmla="val 0"/>
+              <a:gd name="adj3" fmla="val 25000"/>
+              <a:gd name="adj4" fmla="val 43750"/>
+            </a:avLst>
+          </a:prstGeom>
+          <a:ln>
+            <a:solidFill>
+              <a:srgbClr val="654D06"/>
+            </a:solidFill>
+          </a:ln>
+        </p:spPr>
+        <p:style>
+          <a:lnRef idx="2">
+            <a:schemeClr val="accent1">
+              <a:shade val="50000"/>
+            </a:schemeClr>
+          </a:lnRef>
+          <a:fillRef idx="1">
+            <a:schemeClr val="accent1"/>
+          </a:fillRef>
+          <a:effectRef idx="0">
+            <a:schemeClr val="accent1"/>
+          </a:effectRef>
+          <a:fontRef idx="minor">
+            <a:schemeClr val="lt1"/>
+          </a:fontRef>
+        </p:style>
+        <p:txBody>
+          <a:bodyPr rtlCol="0" anchor="ctr"/>
+          <a:lstStyle/>
+          <a:p>
+            <a:pPr algn="ctr"/>
+            <a:endParaRPr lang="en-US" dirty="0">
+              <a:solidFill>
+                <a:schemeClr val="tx1"/>
+              </a:solidFill>
+              <a:latin typeface="Arial" panose="020B0604020202020204" pitchFamily="34" charset="0"/>
+            </a:endParaRPr>
+          </a:p>
+        </p:txBody>
+      </p:sp>
+      <p:sp>
+        <p:nvSpPr>
+          <p:cNvPr id="1733" name="Bent Arrow 1732">
+            <a:extLst>
+              <a:ext uri="{FF2B5EF4-FFF2-40B4-BE49-F238E27FC236}">
+                <a16:creationId xmlns:a16="http://schemas.microsoft.com/office/drawing/2014/main" id="{A74EFCB5-5A87-9145-89DD-10BA22942C71}"/>
+              </a:ext>
+            </a:extLst>
+          </p:cNvPr>
+          <p:cNvSpPr/>
+          <p:nvPr/>
+        </p:nvSpPr>
+        <p:spPr>
+          <a:xfrm flipV="1">
+            <a:off x="3973349" y="935596"/>
+            <a:ext cx="144340" cy="113701"/>
+          </a:xfrm>
+          <a:prstGeom prst="bentArrow">
+            <a:avLst>
+              <a:gd name="adj1" fmla="val 25000"/>
+              <a:gd name="adj2" fmla="val 0"/>
+              <a:gd name="adj3" fmla="val 25000"/>
+              <a:gd name="adj4" fmla="val 43750"/>
+            </a:avLst>
+          </a:prstGeom>
+          <a:ln>
+            <a:solidFill>
+              <a:srgbClr val="654D06"/>
+            </a:solidFill>
+          </a:ln>
+        </p:spPr>
+        <p:style>
+          <a:lnRef idx="2">
+            <a:schemeClr val="accent1">
+              <a:shade val="50000"/>
+            </a:schemeClr>
+          </a:lnRef>
+          <a:fillRef idx="1">
+            <a:schemeClr val="accent1"/>
+          </a:fillRef>
+          <a:effectRef idx="0">
+            <a:schemeClr val="accent1"/>
+          </a:effectRef>
+          <a:fontRef idx="minor">
+            <a:schemeClr val="lt1"/>
+          </a:fontRef>
+        </p:style>
+        <p:txBody>
+          <a:bodyPr rtlCol="0" anchor="ctr"/>
+          <a:lstStyle/>
+          <a:p>
+            <a:pPr algn="ctr"/>
+            <a:endParaRPr lang="en-US" dirty="0">
+              <a:solidFill>
+                <a:schemeClr val="tx1"/>
+              </a:solidFill>
+              <a:latin typeface="Arial" panose="020B0604020202020204" pitchFamily="34" charset="0"/>
+            </a:endParaRPr>
+          </a:p>
+        </p:txBody>
+      </p:sp>
+      <p:sp>
+        <p:nvSpPr>
+          <p:cNvPr id="1734" name="Oval 1733">
+            <a:extLst>
+              <a:ext uri="{FF2B5EF4-FFF2-40B4-BE49-F238E27FC236}">
+                <a16:creationId xmlns:a16="http://schemas.microsoft.com/office/drawing/2014/main" id="{8B0E0B25-C227-384F-84A7-5400764AF0C1}"/>
+              </a:ext>
+            </a:extLst>
+          </p:cNvPr>
+          <p:cNvSpPr>
+            <a:spLocks/>
+          </p:cNvSpPr>
+          <p:nvPr/>
+        </p:nvSpPr>
+        <p:spPr>
+          <a:xfrm>
+            <a:off x="4281338" y="1478506"/>
+            <a:ext cx="64008" cy="64008"/>
+          </a:xfrm>
+          <a:prstGeom prst="ellipse">
+            <a:avLst/>
+          </a:prstGeom>
+          <a:solidFill>
+            <a:schemeClr val="accent1"/>
+          </a:solidFill>
+          <a:ln w="0">
+            <a:noFill/>
+          </a:ln>
+        </p:spPr>
+        <p:style>
+          <a:lnRef idx="2">
+            <a:schemeClr val="accent1">
+              <a:shade val="50000"/>
+            </a:schemeClr>
+          </a:lnRef>
+          <a:fillRef idx="1">
+            <a:schemeClr val="accent1"/>
+          </a:fillRef>
+          <a:effectRef idx="0">
+            <a:schemeClr val="accent1"/>
+          </a:effectRef>
+          <a:fontRef idx="minor">
+            <a:schemeClr val="lt1"/>
+          </a:fontRef>
+        </p:style>
+        <p:txBody>
+          <a:bodyPr rtlCol="0" anchor="ctr"/>
+          <a:lstStyle/>
+          <a:p>
+            <a:pPr algn="just"/>
+            <a:endParaRPr lang="en-US" dirty="0">
+              <a:latin typeface="Arial" panose="020B0604020202020204" pitchFamily="34" charset="0"/>
+            </a:endParaRPr>
+          </a:p>
+        </p:txBody>
+      </p:sp>
+      <p:sp>
+        <p:nvSpPr>
+          <p:cNvPr id="1735" name="Bent Arrow 1734">
+            <a:extLst>
+              <a:ext uri="{FF2B5EF4-FFF2-40B4-BE49-F238E27FC236}">
+                <a16:creationId xmlns:a16="http://schemas.microsoft.com/office/drawing/2014/main" id="{B13A4C4B-9B89-354A-9B82-E8A31874F840}"/>
+              </a:ext>
+            </a:extLst>
+          </p:cNvPr>
+          <p:cNvSpPr/>
+          <p:nvPr/>
+        </p:nvSpPr>
+        <p:spPr>
+          <a:xfrm flipV="1">
+            <a:off x="3520826" y="1514456"/>
+            <a:ext cx="415826" cy="172974"/>
+          </a:xfrm>
+          <a:prstGeom prst="bentArrow">
+            <a:avLst>
+              <a:gd name="adj1" fmla="val 25000"/>
+              <a:gd name="adj2" fmla="val 0"/>
+              <a:gd name="adj3" fmla="val 25000"/>
+              <a:gd name="adj4" fmla="val 43750"/>
+            </a:avLst>
+          </a:prstGeom>
+          <a:ln>
+            <a:solidFill>
+              <a:srgbClr val="654D06"/>
+            </a:solidFill>
+          </a:ln>
+        </p:spPr>
+        <p:style>
+          <a:lnRef idx="2">
+            <a:schemeClr val="accent1">
+              <a:shade val="50000"/>
+            </a:schemeClr>
+          </a:lnRef>
+          <a:fillRef idx="1">
+            <a:schemeClr val="accent1"/>
+          </a:fillRef>
+          <a:effectRef idx="0">
+            <a:schemeClr val="accent1"/>
+          </a:effectRef>
+          <a:fontRef idx="minor">
+            <a:schemeClr val="lt1"/>
+          </a:fontRef>
+        </p:style>
+        <p:txBody>
+          <a:bodyPr rtlCol="0" anchor="ctr"/>
+          <a:lstStyle/>
+          <a:p>
+            <a:pPr algn="just"/>
+            <a:endParaRPr lang="en-US" dirty="0">
+              <a:solidFill>
+                <a:schemeClr val="tx1"/>
+              </a:solidFill>
+              <a:latin typeface="Arial" panose="020B0604020202020204" pitchFamily="34" charset="0"/>
+            </a:endParaRPr>
+          </a:p>
+        </p:txBody>
+      </p:sp>
+      <p:sp>
+        <p:nvSpPr>
+          <p:cNvPr id="1736" name="Bent Arrow 1735">
+            <a:extLst>
+              <a:ext uri="{FF2B5EF4-FFF2-40B4-BE49-F238E27FC236}">
+                <a16:creationId xmlns:a16="http://schemas.microsoft.com/office/drawing/2014/main" id="{4ECDB97A-0253-AF4F-8200-0EB40B28785B}"/>
+              </a:ext>
+            </a:extLst>
+          </p:cNvPr>
+          <p:cNvSpPr/>
+          <p:nvPr/>
+        </p:nvSpPr>
+        <p:spPr>
+          <a:xfrm>
+            <a:off x="3522462" y="1332499"/>
+            <a:ext cx="152115" cy="182028"/>
+          </a:xfrm>
+          <a:prstGeom prst="bentArrow">
+            <a:avLst>
+              <a:gd name="adj1" fmla="val 25000"/>
+              <a:gd name="adj2" fmla="val 0"/>
+              <a:gd name="adj3" fmla="val 25000"/>
+              <a:gd name="adj4" fmla="val 43750"/>
+            </a:avLst>
+          </a:prstGeom>
+          <a:ln>
+            <a:solidFill>
+              <a:srgbClr val="654D06"/>
+            </a:solidFill>
+          </a:ln>
+        </p:spPr>
+        <p:style>
+          <a:lnRef idx="2">
+            <a:schemeClr val="accent1">
+              <a:shade val="50000"/>
+            </a:schemeClr>
+          </a:lnRef>
+          <a:fillRef idx="1">
+            <a:schemeClr val="accent1"/>
+          </a:fillRef>
+          <a:effectRef idx="0">
+            <a:schemeClr val="accent1"/>
+          </a:effectRef>
+          <a:fontRef idx="minor">
+            <a:schemeClr val="lt1"/>
+          </a:fontRef>
+        </p:style>
+        <p:txBody>
+          <a:bodyPr rtlCol="0" anchor="ctr"/>
+          <a:lstStyle/>
+          <a:p>
+            <a:pPr algn="ctr"/>
+            <a:endParaRPr lang="en-US" dirty="0">
+              <a:solidFill>
+                <a:schemeClr val="tx1"/>
+              </a:solidFill>
+              <a:latin typeface="Arial" panose="020B0604020202020204" pitchFamily="34" charset="0"/>
+            </a:endParaRPr>
+          </a:p>
+        </p:txBody>
+      </p:sp>
+      <p:sp>
+        <p:nvSpPr>
+          <p:cNvPr id="1737" name="Bent Arrow 1736">
+            <a:extLst>
+              <a:ext uri="{FF2B5EF4-FFF2-40B4-BE49-F238E27FC236}">
+                <a16:creationId xmlns:a16="http://schemas.microsoft.com/office/drawing/2014/main" id="{710BE3FA-558D-DD41-863E-C41BC093ADF9}"/>
+              </a:ext>
+            </a:extLst>
+          </p:cNvPr>
+          <p:cNvSpPr/>
+          <p:nvPr/>
+        </p:nvSpPr>
+        <p:spPr>
+          <a:xfrm>
+            <a:off x="3674577" y="1234481"/>
+            <a:ext cx="667760" cy="95367"/>
+          </a:xfrm>
+          <a:prstGeom prst="bentArrow">
+            <a:avLst>
+              <a:gd name="adj1" fmla="val 25000"/>
+              <a:gd name="adj2" fmla="val 0"/>
+              <a:gd name="adj3" fmla="val 25000"/>
+              <a:gd name="adj4" fmla="val 43750"/>
+            </a:avLst>
+          </a:prstGeom>
+          <a:ln>
+            <a:solidFill>
+              <a:srgbClr val="654D06"/>
+            </a:solidFill>
+          </a:ln>
+        </p:spPr>
+        <p:style>
+          <a:lnRef idx="2">
+            <a:schemeClr val="accent1">
+              <a:shade val="50000"/>
+            </a:schemeClr>
+          </a:lnRef>
+          <a:fillRef idx="1">
+            <a:schemeClr val="accent1"/>
+          </a:fillRef>
+          <a:effectRef idx="0">
+            <a:schemeClr val="accent1"/>
+          </a:effectRef>
+          <a:fontRef idx="minor">
+            <a:schemeClr val="lt1"/>
+          </a:fontRef>
+        </p:style>
+        <p:txBody>
+          <a:bodyPr rtlCol="0" anchor="ctr"/>
+          <a:lstStyle/>
+          <a:p>
+            <a:pPr algn="ctr"/>
+            <a:endParaRPr lang="en-US" dirty="0">
+              <a:solidFill>
+                <a:schemeClr val="tx1"/>
+              </a:solidFill>
+              <a:latin typeface="Arial" panose="020B0604020202020204" pitchFamily="34" charset="0"/>
+            </a:endParaRPr>
+          </a:p>
+        </p:txBody>
+      </p:sp>
+      <p:sp>
+        <p:nvSpPr>
+          <p:cNvPr id="1738" name="Bent Arrow 1737">
+            <a:extLst>
+              <a:ext uri="{FF2B5EF4-FFF2-40B4-BE49-F238E27FC236}">
+                <a16:creationId xmlns:a16="http://schemas.microsoft.com/office/drawing/2014/main" id="{E1B03FCC-9A79-F64F-8204-8B26A78E2B63}"/>
+              </a:ext>
+            </a:extLst>
+          </p:cNvPr>
+          <p:cNvSpPr/>
+          <p:nvPr/>
+        </p:nvSpPr>
+        <p:spPr>
+          <a:xfrm flipV="1">
+            <a:off x="3674577" y="1331978"/>
+            <a:ext cx="430928" cy="79488"/>
+          </a:xfrm>
+          <a:prstGeom prst="bentArrow">
+            <a:avLst>
+              <a:gd name="adj1" fmla="val 25000"/>
+              <a:gd name="adj2" fmla="val 0"/>
+              <a:gd name="adj3" fmla="val 25000"/>
+              <a:gd name="adj4" fmla="val 43750"/>
+            </a:avLst>
+          </a:prstGeom>
+          <a:ln>
+            <a:solidFill>
+              <a:srgbClr val="654D06"/>
+            </a:solidFill>
+          </a:ln>
+        </p:spPr>
+        <p:style>
+          <a:lnRef idx="2">
+            <a:schemeClr val="accent1">
+              <a:shade val="50000"/>
+            </a:schemeClr>
+          </a:lnRef>
+          <a:fillRef idx="1">
+            <a:schemeClr val="accent1"/>
+          </a:fillRef>
+          <a:effectRef idx="0">
+            <a:schemeClr val="accent1"/>
+          </a:effectRef>
+          <a:fontRef idx="minor">
+            <a:schemeClr val="lt1"/>
+          </a:fontRef>
+        </p:style>
+        <p:txBody>
+          <a:bodyPr rtlCol="0" anchor="ctr"/>
+          <a:lstStyle/>
+          <a:p>
+            <a:pPr algn="ctr"/>
+            <a:endParaRPr lang="en-US" dirty="0">
+              <a:solidFill>
+                <a:schemeClr val="tx1"/>
+              </a:solidFill>
+              <a:latin typeface="Arial" panose="020B0604020202020204" pitchFamily="34" charset="0"/>
+            </a:endParaRPr>
+          </a:p>
+        </p:txBody>
+      </p:sp>
+      <p:sp>
+        <p:nvSpPr>
+          <p:cNvPr id="1739" name="Bent Arrow 1738">
+            <a:extLst>
+              <a:ext uri="{FF2B5EF4-FFF2-40B4-BE49-F238E27FC236}">
+                <a16:creationId xmlns:a16="http://schemas.microsoft.com/office/drawing/2014/main" id="{BFDE8BB9-B21F-E14F-9040-9882B234CC22}"/>
+              </a:ext>
+            </a:extLst>
+          </p:cNvPr>
+          <p:cNvSpPr/>
+          <p:nvPr/>
+        </p:nvSpPr>
+        <p:spPr>
+          <a:xfrm>
+            <a:off x="3936652" y="1576894"/>
+            <a:ext cx="164598" cy="140986"/>
+          </a:xfrm>
+          <a:prstGeom prst="bentArrow">
+            <a:avLst>
+              <a:gd name="adj1" fmla="val 25000"/>
+              <a:gd name="adj2" fmla="val 0"/>
+              <a:gd name="adj3" fmla="val 25000"/>
+              <a:gd name="adj4" fmla="val 43750"/>
+            </a:avLst>
+          </a:prstGeom>
+          <a:ln>
+            <a:solidFill>
+              <a:srgbClr val="0070C0"/>
+            </a:solidFill>
+          </a:ln>
+        </p:spPr>
+        <p:style>
+          <a:lnRef idx="2">
+            <a:schemeClr val="accent1">
+              <a:shade val="50000"/>
+            </a:schemeClr>
+          </a:lnRef>
+          <a:fillRef idx="1">
+            <a:schemeClr val="accent1"/>
+          </a:fillRef>
+          <a:effectRef idx="0">
+            <a:schemeClr val="accent1"/>
+          </a:effectRef>
+          <a:fontRef idx="minor">
+            <a:schemeClr val="lt1"/>
+          </a:fontRef>
+        </p:style>
+        <p:txBody>
+          <a:bodyPr rtlCol="0" anchor="ctr"/>
+          <a:lstStyle/>
+          <a:p>
+            <a:pPr algn="just"/>
+            <a:endParaRPr lang="en-US" dirty="0">
+              <a:solidFill>
+                <a:schemeClr val="tx1"/>
+              </a:solidFill>
+              <a:latin typeface="Arial" panose="020B0604020202020204" pitchFamily="34" charset="0"/>
+            </a:endParaRPr>
+          </a:p>
+        </p:txBody>
+      </p:sp>
+      <p:sp>
+        <p:nvSpPr>
+          <p:cNvPr id="1740" name="Bent Arrow 1739">
+            <a:extLst>
+              <a:ext uri="{FF2B5EF4-FFF2-40B4-BE49-F238E27FC236}">
+                <a16:creationId xmlns:a16="http://schemas.microsoft.com/office/drawing/2014/main" id="{C304AF07-7DC4-2E47-AD48-438773FD22D5}"/>
+              </a:ext>
+            </a:extLst>
+          </p:cNvPr>
+          <p:cNvSpPr/>
+          <p:nvPr/>
+        </p:nvSpPr>
+        <p:spPr>
+          <a:xfrm flipV="1">
+            <a:off x="3936652" y="1674390"/>
+            <a:ext cx="298522" cy="123396"/>
+          </a:xfrm>
+          <a:prstGeom prst="bentArrow">
+            <a:avLst>
+              <a:gd name="adj1" fmla="val 25000"/>
+              <a:gd name="adj2" fmla="val 0"/>
+              <a:gd name="adj3" fmla="val 25000"/>
+              <a:gd name="adj4" fmla="val 43750"/>
+            </a:avLst>
+          </a:prstGeom>
+          <a:ln>
+            <a:solidFill>
+              <a:srgbClr val="654D06"/>
+            </a:solidFill>
+          </a:ln>
+        </p:spPr>
+        <p:style>
+          <a:lnRef idx="2">
+            <a:schemeClr val="accent1">
+              <a:shade val="50000"/>
+            </a:schemeClr>
+          </a:lnRef>
+          <a:fillRef idx="1">
+            <a:schemeClr val="accent1"/>
+          </a:fillRef>
+          <a:effectRef idx="0">
+            <a:schemeClr val="accent1"/>
+          </a:effectRef>
+          <a:fontRef idx="minor">
+            <a:schemeClr val="lt1"/>
+          </a:fontRef>
+        </p:style>
+        <p:txBody>
+          <a:bodyPr rtlCol="0" anchor="ctr"/>
+          <a:lstStyle/>
+          <a:p>
+            <a:pPr algn="just"/>
+            <a:endParaRPr lang="en-US" dirty="0">
+              <a:solidFill>
+                <a:schemeClr val="tx1"/>
+              </a:solidFill>
+              <a:latin typeface="Arial" panose="020B0604020202020204" pitchFamily="34" charset="0"/>
+            </a:endParaRPr>
+          </a:p>
+        </p:txBody>
+      </p:sp>
+      <p:sp>
+        <p:nvSpPr>
+          <p:cNvPr id="1741" name="Bent Arrow 1740">
+            <a:extLst>
+              <a:ext uri="{FF2B5EF4-FFF2-40B4-BE49-F238E27FC236}">
+                <a16:creationId xmlns:a16="http://schemas.microsoft.com/office/drawing/2014/main" id="{BF0DF807-4775-4A48-9C8C-D8A0514437BF}"/>
+              </a:ext>
+            </a:extLst>
+          </p:cNvPr>
+          <p:cNvSpPr/>
+          <p:nvPr/>
+        </p:nvSpPr>
+        <p:spPr>
+          <a:xfrm>
+            <a:off x="4102889" y="1500292"/>
+            <a:ext cx="185970" cy="103887"/>
+          </a:xfrm>
+          <a:prstGeom prst="bentArrow">
+            <a:avLst>
+              <a:gd name="adj1" fmla="val 25000"/>
+              <a:gd name="adj2" fmla="val 0"/>
+              <a:gd name="adj3" fmla="val 25000"/>
+              <a:gd name="adj4" fmla="val 43750"/>
+            </a:avLst>
+          </a:prstGeom>
+          <a:ln>
+            <a:solidFill>
+              <a:srgbClr val="0070C0"/>
+            </a:solidFill>
+          </a:ln>
+        </p:spPr>
+        <p:style>
+          <a:lnRef idx="2">
+            <a:schemeClr val="accent1">
+              <a:shade val="50000"/>
+            </a:schemeClr>
+          </a:lnRef>
+          <a:fillRef idx="1">
+            <a:schemeClr val="accent1"/>
+          </a:fillRef>
+          <a:effectRef idx="0">
+            <a:schemeClr val="accent1"/>
+          </a:effectRef>
+          <a:fontRef idx="minor">
+            <a:schemeClr val="lt1"/>
+          </a:fontRef>
+        </p:style>
+        <p:txBody>
+          <a:bodyPr rtlCol="0" anchor="ctr"/>
+          <a:lstStyle/>
+          <a:p>
+            <a:pPr algn="just"/>
+            <a:endParaRPr lang="en-US" dirty="0">
+              <a:solidFill>
+                <a:schemeClr val="tx1"/>
+              </a:solidFill>
+              <a:latin typeface="Arial" panose="020B0604020202020204" pitchFamily="34" charset="0"/>
+            </a:endParaRPr>
+          </a:p>
+        </p:txBody>
+      </p:sp>
+      <p:sp>
+        <p:nvSpPr>
+          <p:cNvPr id="1742" name="Bent Arrow 1741">
+            <a:extLst>
+              <a:ext uri="{FF2B5EF4-FFF2-40B4-BE49-F238E27FC236}">
+                <a16:creationId xmlns:a16="http://schemas.microsoft.com/office/drawing/2014/main" id="{4EBF0EA1-F76C-224E-91FD-133E23E3AC3D}"/>
+              </a:ext>
+            </a:extLst>
+          </p:cNvPr>
+          <p:cNvSpPr/>
+          <p:nvPr/>
+        </p:nvSpPr>
+        <p:spPr>
+          <a:xfrm flipV="1">
+            <a:off x="4102886" y="1560688"/>
+            <a:ext cx="279189" cy="101950"/>
+          </a:xfrm>
+          <a:prstGeom prst="bentArrow">
+            <a:avLst>
+              <a:gd name="adj1" fmla="val 25000"/>
+              <a:gd name="adj2" fmla="val 0"/>
+              <a:gd name="adj3" fmla="val 25000"/>
+              <a:gd name="adj4" fmla="val 43750"/>
+            </a:avLst>
+          </a:prstGeom>
+          <a:ln>
+            <a:solidFill>
+              <a:srgbClr val="0070C0"/>
+            </a:solidFill>
+          </a:ln>
+        </p:spPr>
+        <p:style>
+          <a:lnRef idx="2">
+            <a:schemeClr val="accent1">
+              <a:shade val="50000"/>
+            </a:schemeClr>
+          </a:lnRef>
+          <a:fillRef idx="1">
+            <a:schemeClr val="accent1"/>
+          </a:fillRef>
+          <a:effectRef idx="0">
+            <a:schemeClr val="accent1"/>
+          </a:effectRef>
+          <a:fontRef idx="minor">
+            <a:schemeClr val="lt1"/>
+          </a:fontRef>
+        </p:style>
+        <p:txBody>
+          <a:bodyPr rtlCol="0" anchor="ctr"/>
+          <a:lstStyle/>
+          <a:p>
+            <a:pPr algn="just"/>
+            <a:endParaRPr lang="en-US" dirty="0">
+              <a:solidFill>
+                <a:schemeClr val="tx1"/>
+              </a:solidFill>
+              <a:latin typeface="Arial" panose="020B0604020202020204" pitchFamily="34" charset="0"/>
+            </a:endParaRPr>
+          </a:p>
+        </p:txBody>
+      </p:sp>
+      <p:sp>
+        <p:nvSpPr>
+          <p:cNvPr id="1743" name="Oval 1742">
+            <a:extLst>
+              <a:ext uri="{FF2B5EF4-FFF2-40B4-BE49-F238E27FC236}">
+                <a16:creationId xmlns:a16="http://schemas.microsoft.com/office/drawing/2014/main" id="{B6FFB062-449A-A346-95CA-35480B1F2AE7}"/>
+              </a:ext>
+            </a:extLst>
+          </p:cNvPr>
+          <p:cNvSpPr>
+            <a:spLocks/>
+          </p:cNvSpPr>
+          <p:nvPr/>
+        </p:nvSpPr>
+        <p:spPr>
+          <a:xfrm>
+            <a:off x="4349850" y="1636450"/>
+            <a:ext cx="64008" cy="64008"/>
+          </a:xfrm>
+          <a:prstGeom prst="ellipse">
+            <a:avLst/>
+          </a:prstGeom>
+          <a:solidFill>
+            <a:schemeClr val="accent1"/>
+          </a:solidFill>
+          <a:ln w="0">
+            <a:noFill/>
+          </a:ln>
+        </p:spPr>
+        <p:style>
+          <a:lnRef idx="2">
+            <a:schemeClr val="accent1">
+              <a:shade val="50000"/>
+            </a:schemeClr>
+          </a:lnRef>
+          <a:fillRef idx="1">
+            <a:schemeClr val="accent1"/>
+          </a:fillRef>
+          <a:effectRef idx="0">
+            <a:schemeClr val="accent1"/>
+          </a:effectRef>
+          <a:fontRef idx="minor">
+            <a:schemeClr val="lt1"/>
+          </a:fontRef>
+        </p:style>
+        <p:txBody>
+          <a:bodyPr rtlCol="0" anchor="ctr"/>
+          <a:lstStyle/>
+          <a:p>
+            <a:pPr algn="just"/>
+            <a:endParaRPr lang="en-US" dirty="0">
+              <a:latin typeface="Arial" panose="020B0604020202020204" pitchFamily="34" charset="0"/>
+            </a:endParaRPr>
+          </a:p>
+        </p:txBody>
+      </p:sp>
+      <p:sp>
+        <p:nvSpPr>
+          <p:cNvPr id="1744" name="Oval 1743">
+            <a:extLst>
+              <a:ext uri="{FF2B5EF4-FFF2-40B4-BE49-F238E27FC236}">
+                <a16:creationId xmlns:a16="http://schemas.microsoft.com/office/drawing/2014/main" id="{468FD30D-602D-6940-A355-26E452D369BB}"/>
+              </a:ext>
+            </a:extLst>
+          </p:cNvPr>
+          <p:cNvSpPr>
+            <a:spLocks/>
+          </p:cNvSpPr>
+          <p:nvPr/>
+        </p:nvSpPr>
+        <p:spPr>
+          <a:xfrm>
+            <a:off x="4016900" y="1146802"/>
+            <a:ext cx="64008" cy="64008"/>
+          </a:xfrm>
+          <a:prstGeom prst="ellipse">
+            <a:avLst/>
+          </a:prstGeom>
+          <a:solidFill>
+            <a:schemeClr val="accent1"/>
+          </a:solidFill>
+          <a:ln w="0">
+            <a:noFill/>
+          </a:ln>
+        </p:spPr>
+        <p:style>
+          <a:lnRef idx="2">
+            <a:schemeClr val="accent1">
+              <a:shade val="50000"/>
+            </a:schemeClr>
+          </a:lnRef>
+          <a:fillRef idx="1">
+            <a:schemeClr val="accent1"/>
+          </a:fillRef>
+          <a:effectRef idx="0">
+            <a:schemeClr val="accent1"/>
+          </a:effectRef>
+          <a:fontRef idx="minor">
+            <a:schemeClr val="lt1"/>
+          </a:fontRef>
+        </p:style>
+        <p:txBody>
+          <a:bodyPr rtlCol="0" anchor="ctr"/>
+          <a:lstStyle/>
+          <a:p>
+            <a:pPr algn="just"/>
+            <a:endParaRPr lang="en-US" dirty="0">
+              <a:latin typeface="Arial" panose="020B0604020202020204" pitchFamily="34" charset="0"/>
+            </a:endParaRPr>
+          </a:p>
+        </p:txBody>
+      </p:sp>
+      <p:sp>
+        <p:nvSpPr>
+          <p:cNvPr id="1745" name="Bent Arrow 1744">
+            <a:extLst>
+              <a:ext uri="{FF2B5EF4-FFF2-40B4-BE49-F238E27FC236}">
+                <a16:creationId xmlns:a16="http://schemas.microsoft.com/office/drawing/2014/main" id="{535A94EB-6C65-044D-8C15-03C8DDB95D23}"/>
+              </a:ext>
+            </a:extLst>
+          </p:cNvPr>
+          <p:cNvSpPr/>
+          <p:nvPr/>
+        </p:nvSpPr>
+        <p:spPr>
+          <a:xfrm flipV="1">
+            <a:off x="3244763" y="1931124"/>
+            <a:ext cx="173859" cy="241266"/>
+          </a:xfrm>
+          <a:prstGeom prst="bentArrow">
+            <a:avLst>
+              <a:gd name="adj1" fmla="val 25000"/>
+              <a:gd name="adj2" fmla="val 0"/>
+              <a:gd name="adj3" fmla="val 25000"/>
+              <a:gd name="adj4" fmla="val 35544"/>
+            </a:avLst>
+          </a:prstGeom>
+          <a:ln>
+            <a:solidFill>
+              <a:srgbClr val="654D06"/>
+            </a:solidFill>
+          </a:ln>
+        </p:spPr>
+        <p:style>
+          <a:lnRef idx="2">
+            <a:schemeClr val="accent1">
+              <a:shade val="50000"/>
+            </a:schemeClr>
+          </a:lnRef>
+          <a:fillRef idx="1">
+            <a:schemeClr val="accent1"/>
+          </a:fillRef>
+          <a:effectRef idx="0">
+            <a:schemeClr val="accent1"/>
+          </a:effectRef>
+          <a:fontRef idx="minor">
+            <a:schemeClr val="lt1"/>
+          </a:fontRef>
+        </p:style>
+        <p:txBody>
+          <a:bodyPr rtlCol="0" anchor="ctr"/>
+          <a:lstStyle/>
+          <a:p>
+            <a:pPr algn="ctr"/>
+            <a:endParaRPr lang="en-US" dirty="0">
+              <a:solidFill>
+                <a:schemeClr val="tx1"/>
+              </a:solidFill>
+              <a:latin typeface="Arial" panose="020B0604020202020204" pitchFamily="34" charset="0"/>
+            </a:endParaRPr>
+          </a:p>
+        </p:txBody>
+      </p:sp>
+      <p:sp>
+        <p:nvSpPr>
+          <p:cNvPr id="1746" name="Bent Arrow 1745">
+            <a:extLst>
+              <a:ext uri="{FF2B5EF4-FFF2-40B4-BE49-F238E27FC236}">
+                <a16:creationId xmlns:a16="http://schemas.microsoft.com/office/drawing/2014/main" id="{935F49F3-8823-E34C-8547-48DF01A2FD63}"/>
+              </a:ext>
+            </a:extLst>
+          </p:cNvPr>
+          <p:cNvSpPr/>
+          <p:nvPr/>
+        </p:nvSpPr>
+        <p:spPr>
+          <a:xfrm>
+            <a:off x="3593676" y="2204384"/>
+            <a:ext cx="235076" cy="196694"/>
+          </a:xfrm>
+          <a:prstGeom prst="bentArrow">
+            <a:avLst>
+              <a:gd name="adj1" fmla="val 25000"/>
+              <a:gd name="adj2" fmla="val 0"/>
+              <a:gd name="adj3" fmla="val 25000"/>
+              <a:gd name="adj4" fmla="val 43750"/>
+            </a:avLst>
+          </a:prstGeom>
+          <a:ln>
+            <a:solidFill>
+              <a:srgbClr val="654D06"/>
+            </a:solidFill>
+          </a:ln>
+        </p:spPr>
+        <p:style>
+          <a:lnRef idx="2">
+            <a:schemeClr val="accent1">
+              <a:shade val="50000"/>
+            </a:schemeClr>
+          </a:lnRef>
+          <a:fillRef idx="1">
+            <a:schemeClr val="accent1"/>
+          </a:fillRef>
+          <a:effectRef idx="0">
+            <a:schemeClr val="accent1"/>
+          </a:effectRef>
+          <a:fontRef idx="minor">
+            <a:schemeClr val="lt1"/>
+          </a:fontRef>
+        </p:style>
+        <p:txBody>
+          <a:bodyPr rtlCol="0" anchor="ctr"/>
+          <a:lstStyle/>
+          <a:p>
+            <a:pPr algn="ctr"/>
+            <a:endParaRPr lang="en-US" dirty="0">
+              <a:solidFill>
+                <a:schemeClr val="tx1"/>
+              </a:solidFill>
+              <a:latin typeface="Arial" panose="020B0604020202020204" pitchFamily="34" charset="0"/>
+            </a:endParaRPr>
+          </a:p>
+        </p:txBody>
+      </p:sp>
+      <p:sp>
+        <p:nvSpPr>
+          <p:cNvPr id="1747" name="Bent Arrow 1746">
+            <a:extLst>
+              <a:ext uri="{FF2B5EF4-FFF2-40B4-BE49-F238E27FC236}">
+                <a16:creationId xmlns:a16="http://schemas.microsoft.com/office/drawing/2014/main" id="{D700FFCA-C444-FB49-997E-A447811E24EF}"/>
+              </a:ext>
+            </a:extLst>
+          </p:cNvPr>
+          <p:cNvSpPr/>
+          <p:nvPr/>
+        </p:nvSpPr>
+        <p:spPr>
+          <a:xfrm flipV="1">
+            <a:off x="3593676" y="2384884"/>
+            <a:ext cx="407875" cy="211041"/>
+          </a:xfrm>
+          <a:prstGeom prst="bentArrow">
+            <a:avLst>
+              <a:gd name="adj1" fmla="val 25000"/>
+              <a:gd name="adj2" fmla="val 0"/>
+              <a:gd name="adj3" fmla="val 25000"/>
+              <a:gd name="adj4" fmla="val 43750"/>
+            </a:avLst>
+          </a:prstGeom>
+          <a:ln>
+            <a:solidFill>
+              <a:srgbClr val="654D06"/>
+            </a:solidFill>
+          </a:ln>
+        </p:spPr>
+        <p:style>
+          <a:lnRef idx="2">
+            <a:schemeClr val="accent1">
+              <a:shade val="50000"/>
+            </a:schemeClr>
+          </a:lnRef>
+          <a:fillRef idx="1">
+            <a:schemeClr val="accent1"/>
+          </a:fillRef>
+          <a:effectRef idx="0">
+            <a:schemeClr val="accent1"/>
+          </a:effectRef>
+          <a:fontRef idx="minor">
+            <a:schemeClr val="lt1"/>
+          </a:fontRef>
+        </p:style>
+        <p:txBody>
+          <a:bodyPr rtlCol="0" anchor="ctr"/>
+          <a:lstStyle/>
+          <a:p>
+            <a:pPr algn="ctr"/>
+            <a:endParaRPr lang="en-US" dirty="0">
+              <a:solidFill>
+                <a:schemeClr val="tx1"/>
+              </a:solidFill>
+              <a:latin typeface="Arial" panose="020B0604020202020204" pitchFamily="34" charset="0"/>
+            </a:endParaRPr>
+          </a:p>
+        </p:txBody>
+      </p:sp>
+      <p:sp>
+        <p:nvSpPr>
+          <p:cNvPr id="1748" name="Bent Arrow 1747">
+            <a:extLst>
+              <a:ext uri="{FF2B5EF4-FFF2-40B4-BE49-F238E27FC236}">
+                <a16:creationId xmlns:a16="http://schemas.microsoft.com/office/drawing/2014/main" id="{4F2C05CD-E065-7D4C-BB4F-C281807368A4}"/>
+              </a:ext>
+            </a:extLst>
+          </p:cNvPr>
+          <p:cNvSpPr/>
+          <p:nvPr/>
+        </p:nvSpPr>
+        <p:spPr>
+          <a:xfrm flipV="1">
+            <a:off x="4001551" y="2602662"/>
+            <a:ext cx="263839" cy="118497"/>
+          </a:xfrm>
+          <a:prstGeom prst="bentArrow">
+            <a:avLst>
+              <a:gd name="adj1" fmla="val 25000"/>
+              <a:gd name="adj2" fmla="val 0"/>
+              <a:gd name="adj3" fmla="val 25000"/>
+              <a:gd name="adj4" fmla="val 43750"/>
+            </a:avLst>
+          </a:prstGeom>
+          <a:ln>
+            <a:solidFill>
+              <a:srgbClr val="654D06"/>
+            </a:solidFill>
+          </a:ln>
+        </p:spPr>
+        <p:style>
+          <a:lnRef idx="2">
+            <a:schemeClr val="accent1">
+              <a:shade val="50000"/>
+            </a:schemeClr>
+          </a:lnRef>
+          <a:fillRef idx="1">
+            <a:schemeClr val="accent1"/>
+          </a:fillRef>
+          <a:effectRef idx="0">
+            <a:schemeClr val="accent1"/>
+          </a:effectRef>
+          <a:fontRef idx="minor">
+            <a:schemeClr val="lt1"/>
+          </a:fontRef>
+        </p:style>
+        <p:txBody>
+          <a:bodyPr rtlCol="0" anchor="ctr"/>
+          <a:lstStyle/>
+          <a:p>
+            <a:pPr algn="ctr"/>
+            <a:endParaRPr lang="en-US" dirty="0">
+              <a:solidFill>
+                <a:schemeClr val="tx1"/>
+              </a:solidFill>
+              <a:latin typeface="Arial" panose="020B0604020202020204" pitchFamily="34" charset="0"/>
+            </a:endParaRPr>
+          </a:p>
+        </p:txBody>
+      </p:sp>
+      <p:sp>
+        <p:nvSpPr>
+          <p:cNvPr id="1749" name="Bent Arrow 1748">
+            <a:extLst>
+              <a:ext uri="{FF2B5EF4-FFF2-40B4-BE49-F238E27FC236}">
+                <a16:creationId xmlns:a16="http://schemas.microsoft.com/office/drawing/2014/main" id="{FC823AEA-6AD6-4145-B280-B14BAA8B394E}"/>
+              </a:ext>
+            </a:extLst>
+          </p:cNvPr>
+          <p:cNvSpPr/>
+          <p:nvPr/>
+        </p:nvSpPr>
+        <p:spPr>
+          <a:xfrm>
+            <a:off x="3827848" y="2101768"/>
+            <a:ext cx="92474" cy="111575"/>
+          </a:xfrm>
+          <a:prstGeom prst="bentArrow">
+            <a:avLst>
+              <a:gd name="adj1" fmla="val 25000"/>
+              <a:gd name="adj2" fmla="val 0"/>
+              <a:gd name="adj3" fmla="val 25000"/>
+              <a:gd name="adj4" fmla="val 43750"/>
+            </a:avLst>
+          </a:prstGeom>
+          <a:ln>
+            <a:solidFill>
+              <a:srgbClr val="654D06"/>
+            </a:solidFill>
+          </a:ln>
+        </p:spPr>
+        <p:style>
+          <a:lnRef idx="2">
+            <a:schemeClr val="accent1">
+              <a:shade val="50000"/>
+            </a:schemeClr>
+          </a:lnRef>
+          <a:fillRef idx="1">
+            <a:schemeClr val="accent1"/>
+          </a:fillRef>
+          <a:effectRef idx="0">
+            <a:schemeClr val="accent1"/>
+          </a:effectRef>
+          <a:fontRef idx="minor">
+            <a:schemeClr val="lt1"/>
+          </a:fontRef>
+        </p:style>
+        <p:txBody>
+          <a:bodyPr rtlCol="0" anchor="ctr"/>
+          <a:lstStyle/>
+          <a:p>
+            <a:pPr algn="ctr"/>
+            <a:endParaRPr lang="en-US" dirty="0">
+              <a:solidFill>
+                <a:schemeClr val="tx1"/>
+              </a:solidFill>
+              <a:latin typeface="Arial" panose="020B0604020202020204" pitchFamily="34" charset="0"/>
+            </a:endParaRPr>
+          </a:p>
+        </p:txBody>
+      </p:sp>
+      <p:sp>
+        <p:nvSpPr>
+          <p:cNvPr id="1750" name="Bent Arrow 1749">
+            <a:extLst>
+              <a:ext uri="{FF2B5EF4-FFF2-40B4-BE49-F238E27FC236}">
+                <a16:creationId xmlns:a16="http://schemas.microsoft.com/office/drawing/2014/main" id="{24E00B88-E9EA-A249-86BC-A238D0CDA245}"/>
+              </a:ext>
+            </a:extLst>
+          </p:cNvPr>
+          <p:cNvSpPr/>
+          <p:nvPr/>
+        </p:nvSpPr>
+        <p:spPr>
+          <a:xfrm flipV="1">
+            <a:off x="3827848" y="2206974"/>
+            <a:ext cx="450004" cy="81808"/>
+          </a:xfrm>
+          <a:prstGeom prst="bentArrow">
+            <a:avLst>
+              <a:gd name="adj1" fmla="val 25000"/>
+              <a:gd name="adj2" fmla="val 0"/>
+              <a:gd name="adj3" fmla="val 25000"/>
+              <a:gd name="adj4" fmla="val 43750"/>
+            </a:avLst>
+          </a:prstGeom>
+          <a:ln>
+            <a:solidFill>
+              <a:srgbClr val="654D06"/>
+            </a:solidFill>
+          </a:ln>
+        </p:spPr>
+        <p:style>
+          <a:lnRef idx="2">
+            <a:schemeClr val="accent1">
+              <a:shade val="50000"/>
+            </a:schemeClr>
+          </a:lnRef>
+          <a:fillRef idx="1">
+            <a:schemeClr val="accent1"/>
+          </a:fillRef>
+          <a:effectRef idx="0">
+            <a:schemeClr val="accent1"/>
+          </a:effectRef>
+          <a:fontRef idx="minor">
+            <a:schemeClr val="lt1"/>
+          </a:fontRef>
+        </p:style>
+        <p:txBody>
+          <a:bodyPr rtlCol="0" anchor="ctr"/>
+          <a:lstStyle/>
+          <a:p>
+            <a:pPr algn="ctr"/>
+            <a:endParaRPr lang="en-US" dirty="0">
+              <a:solidFill>
+                <a:schemeClr val="tx1"/>
+              </a:solidFill>
+              <a:latin typeface="Arial" panose="020B0604020202020204" pitchFamily="34" charset="0"/>
+            </a:endParaRPr>
+          </a:p>
+        </p:txBody>
+      </p:sp>
+      <p:sp>
+        <p:nvSpPr>
+          <p:cNvPr id="1751" name="Bent Arrow 1750">
+            <a:extLst>
+              <a:ext uri="{FF2B5EF4-FFF2-40B4-BE49-F238E27FC236}">
+                <a16:creationId xmlns:a16="http://schemas.microsoft.com/office/drawing/2014/main" id="{82328816-B331-2743-AE7F-5054DA82FA95}"/>
+              </a:ext>
+            </a:extLst>
+          </p:cNvPr>
+          <p:cNvSpPr/>
+          <p:nvPr/>
+        </p:nvSpPr>
+        <p:spPr>
+          <a:xfrm>
+            <a:off x="3929507" y="2047537"/>
+            <a:ext cx="284525" cy="54887"/>
+          </a:xfrm>
+          <a:prstGeom prst="bentArrow">
+            <a:avLst>
+              <a:gd name="adj1" fmla="val 25000"/>
+              <a:gd name="adj2" fmla="val 0"/>
+              <a:gd name="adj3" fmla="val 25000"/>
+              <a:gd name="adj4" fmla="val 43750"/>
+            </a:avLst>
+          </a:prstGeom>
+          <a:ln>
+            <a:solidFill>
+              <a:srgbClr val="654D06"/>
+            </a:solidFill>
+          </a:ln>
+        </p:spPr>
+        <p:style>
+          <a:lnRef idx="2">
+            <a:schemeClr val="accent1">
+              <a:shade val="50000"/>
+            </a:schemeClr>
+          </a:lnRef>
+          <a:fillRef idx="1">
+            <a:schemeClr val="accent1"/>
+          </a:fillRef>
+          <a:effectRef idx="0">
+            <a:schemeClr val="accent1"/>
+          </a:effectRef>
+          <a:fontRef idx="minor">
+            <a:schemeClr val="lt1"/>
+          </a:fontRef>
+        </p:style>
+        <p:txBody>
+          <a:bodyPr rtlCol="0" anchor="ctr"/>
+          <a:lstStyle/>
+          <a:p>
+            <a:pPr algn="ctr"/>
+            <a:endParaRPr lang="en-US" dirty="0">
+              <a:solidFill>
+                <a:schemeClr val="tx1"/>
+              </a:solidFill>
+              <a:latin typeface="Arial" panose="020B0604020202020204" pitchFamily="34" charset="0"/>
+            </a:endParaRPr>
+          </a:p>
+        </p:txBody>
+      </p:sp>
+      <p:sp>
+        <p:nvSpPr>
+          <p:cNvPr id="1752" name="Bent Arrow 1751">
+            <a:extLst>
+              <a:ext uri="{FF2B5EF4-FFF2-40B4-BE49-F238E27FC236}">
+                <a16:creationId xmlns:a16="http://schemas.microsoft.com/office/drawing/2014/main" id="{44AEEE66-8674-E54A-833B-8F17BD536EA1}"/>
+              </a:ext>
+            </a:extLst>
+          </p:cNvPr>
+          <p:cNvSpPr/>
+          <p:nvPr/>
+        </p:nvSpPr>
+        <p:spPr>
+          <a:xfrm flipV="1">
+            <a:off x="3927918" y="2098240"/>
+            <a:ext cx="344664" cy="56749"/>
+          </a:xfrm>
+          <a:prstGeom prst="bentArrow">
+            <a:avLst>
+              <a:gd name="adj1" fmla="val 25000"/>
+              <a:gd name="adj2" fmla="val 0"/>
+              <a:gd name="adj3" fmla="val 25000"/>
+              <a:gd name="adj4" fmla="val 43750"/>
+            </a:avLst>
+          </a:prstGeom>
+          <a:ln>
+            <a:solidFill>
+              <a:srgbClr val="654D06"/>
+            </a:solidFill>
+          </a:ln>
+        </p:spPr>
+        <p:style>
+          <a:lnRef idx="2">
+            <a:schemeClr val="accent1">
+              <a:shade val="50000"/>
+            </a:schemeClr>
+          </a:lnRef>
+          <a:fillRef idx="1">
+            <a:schemeClr val="accent1"/>
+          </a:fillRef>
+          <a:effectRef idx="0">
+            <a:schemeClr val="accent1"/>
+          </a:effectRef>
+          <a:fontRef idx="minor">
+            <a:schemeClr val="lt1"/>
+          </a:fontRef>
+        </p:style>
+        <p:txBody>
+          <a:bodyPr rtlCol="0" anchor="ctr"/>
+          <a:lstStyle/>
+          <a:p>
+            <a:pPr algn="ctr"/>
+            <a:endParaRPr lang="en-US" dirty="0">
+              <a:solidFill>
+                <a:schemeClr val="tx1"/>
+              </a:solidFill>
+              <a:latin typeface="Arial" panose="020B0604020202020204" pitchFamily="34" charset="0"/>
+            </a:endParaRPr>
+          </a:p>
+        </p:txBody>
+      </p:sp>
+      <p:sp>
+        <p:nvSpPr>
+          <p:cNvPr id="1753" name="Bent Arrow 1752">
+            <a:extLst>
+              <a:ext uri="{FF2B5EF4-FFF2-40B4-BE49-F238E27FC236}">
+                <a16:creationId xmlns:a16="http://schemas.microsoft.com/office/drawing/2014/main" id="{07341747-54A0-674F-85BB-F0E4E5A70C11}"/>
+              </a:ext>
+            </a:extLst>
+          </p:cNvPr>
+          <p:cNvSpPr/>
+          <p:nvPr/>
+        </p:nvSpPr>
+        <p:spPr>
+          <a:xfrm>
+            <a:off x="4001551" y="2463822"/>
+            <a:ext cx="238753" cy="142256"/>
+          </a:xfrm>
+          <a:prstGeom prst="bentArrow">
+            <a:avLst>
+              <a:gd name="adj1" fmla="val 25000"/>
+              <a:gd name="adj2" fmla="val 0"/>
+              <a:gd name="adj3" fmla="val 25000"/>
+              <a:gd name="adj4" fmla="val 43750"/>
+            </a:avLst>
+          </a:prstGeom>
+          <a:ln>
+            <a:solidFill>
+              <a:srgbClr val="0070C0"/>
+            </a:solidFill>
+          </a:ln>
+        </p:spPr>
+        <p:style>
+          <a:lnRef idx="2">
+            <a:schemeClr val="accent1">
+              <a:shade val="50000"/>
+            </a:schemeClr>
+          </a:lnRef>
+          <a:fillRef idx="1">
+            <a:schemeClr val="accent1"/>
+          </a:fillRef>
+          <a:effectRef idx="0">
+            <a:schemeClr val="accent1"/>
+          </a:effectRef>
+          <a:fontRef idx="minor">
+            <a:schemeClr val="lt1"/>
+          </a:fontRef>
+        </p:style>
+        <p:txBody>
+          <a:bodyPr rtlCol="0" anchor="ctr"/>
+          <a:lstStyle/>
+          <a:p>
+            <a:pPr algn="just"/>
+            <a:endParaRPr lang="en-US" dirty="0">
+              <a:solidFill>
+                <a:schemeClr val="tx1"/>
+              </a:solidFill>
+              <a:latin typeface="Arial" panose="020B0604020202020204" pitchFamily="34" charset="0"/>
+            </a:endParaRPr>
+          </a:p>
+        </p:txBody>
+      </p:sp>
+      <p:sp>
+        <p:nvSpPr>
+          <p:cNvPr id="1754" name="Bent Arrow 1753">
+            <a:extLst>
+              <a:ext uri="{FF2B5EF4-FFF2-40B4-BE49-F238E27FC236}">
+                <a16:creationId xmlns:a16="http://schemas.microsoft.com/office/drawing/2014/main" id="{EC3B9A25-D5F3-5042-B1A8-62AD84274171}"/>
+              </a:ext>
+            </a:extLst>
+          </p:cNvPr>
+          <p:cNvSpPr/>
+          <p:nvPr/>
+        </p:nvSpPr>
+        <p:spPr>
+          <a:xfrm>
+            <a:off x="4237935" y="2376222"/>
+            <a:ext cx="284525" cy="117978"/>
+          </a:xfrm>
+          <a:prstGeom prst="bentArrow">
+            <a:avLst>
+              <a:gd name="adj1" fmla="val 25000"/>
+              <a:gd name="adj2" fmla="val 0"/>
+              <a:gd name="adj3" fmla="val 25000"/>
+              <a:gd name="adj4" fmla="val 43750"/>
+            </a:avLst>
+          </a:prstGeom>
+          <a:ln>
+            <a:solidFill>
+              <a:srgbClr val="0070C0"/>
+            </a:solidFill>
+          </a:ln>
+        </p:spPr>
+        <p:style>
+          <a:lnRef idx="2">
+            <a:schemeClr val="accent1">
+              <a:shade val="50000"/>
+            </a:schemeClr>
+          </a:lnRef>
+          <a:fillRef idx="1">
+            <a:schemeClr val="accent1"/>
+          </a:fillRef>
+          <a:effectRef idx="0">
+            <a:schemeClr val="accent1"/>
+          </a:effectRef>
+          <a:fontRef idx="minor">
+            <a:schemeClr val="lt1"/>
+          </a:fontRef>
+        </p:style>
+        <p:txBody>
+          <a:bodyPr rtlCol="0" anchor="ctr"/>
+          <a:lstStyle/>
+          <a:p>
+            <a:pPr algn="just"/>
+            <a:endParaRPr lang="en-US" dirty="0">
+              <a:solidFill>
+                <a:schemeClr val="tx1"/>
+              </a:solidFill>
+              <a:latin typeface="Arial" panose="020B0604020202020204" pitchFamily="34" charset="0"/>
+            </a:endParaRPr>
+          </a:p>
+        </p:txBody>
+      </p:sp>
+      <p:sp>
+        <p:nvSpPr>
+          <p:cNvPr id="1755" name="Bent Arrow 1754">
+            <a:extLst>
+              <a:ext uri="{FF2B5EF4-FFF2-40B4-BE49-F238E27FC236}">
+                <a16:creationId xmlns:a16="http://schemas.microsoft.com/office/drawing/2014/main" id="{853F339A-8808-B44A-8E94-226F54C76469}"/>
+              </a:ext>
+            </a:extLst>
+          </p:cNvPr>
+          <p:cNvSpPr/>
+          <p:nvPr/>
+        </p:nvSpPr>
+        <p:spPr>
+          <a:xfrm flipV="1">
+            <a:off x="4237933" y="2450708"/>
+            <a:ext cx="344664" cy="78055"/>
+          </a:xfrm>
+          <a:prstGeom prst="bentArrow">
+            <a:avLst>
+              <a:gd name="adj1" fmla="val 25000"/>
+              <a:gd name="adj2" fmla="val 0"/>
+              <a:gd name="adj3" fmla="val 25000"/>
+              <a:gd name="adj4" fmla="val 43750"/>
+            </a:avLst>
+          </a:prstGeom>
+          <a:ln>
+            <a:solidFill>
+              <a:srgbClr val="0070C0"/>
+            </a:solidFill>
+          </a:ln>
+        </p:spPr>
+        <p:style>
+          <a:lnRef idx="2">
+            <a:schemeClr val="accent1">
+              <a:shade val="50000"/>
+            </a:schemeClr>
+          </a:lnRef>
+          <a:fillRef idx="1">
+            <a:schemeClr val="accent1"/>
+          </a:fillRef>
+          <a:effectRef idx="0">
+            <a:schemeClr val="accent1"/>
+          </a:effectRef>
+          <a:fontRef idx="minor">
+            <a:schemeClr val="lt1"/>
+          </a:fontRef>
+        </p:style>
+        <p:txBody>
+          <a:bodyPr rtlCol="0" anchor="ctr"/>
+          <a:lstStyle/>
+          <a:p>
+            <a:pPr algn="just"/>
+            <a:endParaRPr lang="en-US" dirty="0">
+              <a:solidFill>
+                <a:schemeClr val="tx1"/>
+              </a:solidFill>
+              <a:latin typeface="Arial" panose="020B0604020202020204" pitchFamily="34" charset="0"/>
+            </a:endParaRPr>
+          </a:p>
+        </p:txBody>
+      </p:sp>
+      <p:sp>
+        <p:nvSpPr>
+          <p:cNvPr id="1756" name="Oval 1755">
+            <a:extLst>
+              <a:ext uri="{FF2B5EF4-FFF2-40B4-BE49-F238E27FC236}">
+                <a16:creationId xmlns:a16="http://schemas.microsoft.com/office/drawing/2014/main" id="{427B8C09-DFFF-774D-B93A-386456E610F7}"/>
+              </a:ext>
+            </a:extLst>
+          </p:cNvPr>
+          <p:cNvSpPr>
+            <a:spLocks/>
+          </p:cNvSpPr>
+          <p:nvPr/>
+        </p:nvSpPr>
+        <p:spPr>
+          <a:xfrm>
+            <a:off x="4491219" y="2350473"/>
+            <a:ext cx="64008" cy="64008"/>
+          </a:xfrm>
+          <a:prstGeom prst="ellipse">
+            <a:avLst/>
+          </a:prstGeom>
+          <a:solidFill>
+            <a:schemeClr val="accent1"/>
+          </a:solidFill>
+          <a:ln w="0">
+            <a:noFill/>
+          </a:ln>
+        </p:spPr>
+        <p:style>
+          <a:lnRef idx="2">
+            <a:schemeClr val="accent1">
+              <a:shade val="50000"/>
+            </a:schemeClr>
+          </a:lnRef>
+          <a:fillRef idx="1">
+            <a:schemeClr val="accent1"/>
+          </a:fillRef>
+          <a:effectRef idx="0">
+            <a:schemeClr val="accent1"/>
+          </a:effectRef>
+          <a:fontRef idx="minor">
+            <a:schemeClr val="lt1"/>
+          </a:fontRef>
+        </p:style>
+        <p:txBody>
+          <a:bodyPr rtlCol="0" anchor="ctr"/>
+          <a:lstStyle/>
+          <a:p>
+            <a:pPr algn="just"/>
+            <a:endParaRPr lang="en-US" dirty="0">
+              <a:latin typeface="Arial" panose="020B0604020202020204" pitchFamily="34" charset="0"/>
+            </a:endParaRPr>
+          </a:p>
+        </p:txBody>
+      </p:sp>
+      <p:sp>
+        <p:nvSpPr>
+          <p:cNvPr id="1757" name="Oval 1756">
+            <a:extLst>
+              <a:ext uri="{FF2B5EF4-FFF2-40B4-BE49-F238E27FC236}">
+                <a16:creationId xmlns:a16="http://schemas.microsoft.com/office/drawing/2014/main" id="{B5C4FA84-4A41-5141-88B0-AC3C7752E151}"/>
+              </a:ext>
+            </a:extLst>
+          </p:cNvPr>
+          <p:cNvSpPr>
+            <a:spLocks/>
+          </p:cNvSpPr>
+          <p:nvPr/>
+        </p:nvSpPr>
+        <p:spPr>
+          <a:xfrm>
+            <a:off x="4558174" y="2507947"/>
+            <a:ext cx="64008" cy="64008"/>
+          </a:xfrm>
+          <a:prstGeom prst="ellipse">
+            <a:avLst/>
+          </a:prstGeom>
+          <a:solidFill>
+            <a:schemeClr val="accent1"/>
+          </a:solidFill>
+          <a:ln w="0">
+            <a:noFill/>
+          </a:ln>
+        </p:spPr>
+        <p:style>
+          <a:lnRef idx="2">
+            <a:schemeClr val="accent1">
+              <a:shade val="50000"/>
+            </a:schemeClr>
+          </a:lnRef>
+          <a:fillRef idx="1">
+            <a:schemeClr val="accent1"/>
+          </a:fillRef>
+          <a:effectRef idx="0">
+            <a:schemeClr val="accent1"/>
+          </a:effectRef>
+          <a:fontRef idx="minor">
+            <a:schemeClr val="lt1"/>
+          </a:fontRef>
+        </p:style>
+        <p:txBody>
+          <a:bodyPr rtlCol="0" anchor="ctr"/>
+          <a:lstStyle/>
+          <a:p>
+            <a:pPr algn="just"/>
+            <a:endParaRPr lang="en-US" dirty="0">
+              <a:latin typeface="Arial" panose="020B0604020202020204" pitchFamily="34" charset="0"/>
+            </a:endParaRPr>
+          </a:p>
+        </p:txBody>
+      </p:sp>
+      <p:sp>
+        <p:nvSpPr>
+          <p:cNvPr id="1758" name="Bent Arrow 1757">
+            <a:extLst>
+              <a:ext uri="{FF2B5EF4-FFF2-40B4-BE49-F238E27FC236}">
+                <a16:creationId xmlns:a16="http://schemas.microsoft.com/office/drawing/2014/main" id="{8835CA71-084A-E64C-B411-6BB8BD19E09C}"/>
+              </a:ext>
+            </a:extLst>
+          </p:cNvPr>
+          <p:cNvSpPr/>
+          <p:nvPr/>
+        </p:nvSpPr>
+        <p:spPr>
+          <a:xfrm>
+            <a:off x="4265816" y="2621422"/>
+            <a:ext cx="154453" cy="98537"/>
+          </a:xfrm>
+          <a:prstGeom prst="bentArrow">
+            <a:avLst>
+              <a:gd name="adj1" fmla="val 25000"/>
+              <a:gd name="adj2" fmla="val 0"/>
+              <a:gd name="adj3" fmla="val 25000"/>
+              <a:gd name="adj4" fmla="val 43750"/>
+            </a:avLst>
+          </a:prstGeom>
+          <a:ln>
+            <a:solidFill>
+              <a:srgbClr val="654D06"/>
+            </a:solidFill>
+          </a:ln>
+          <a:effectLst/>
+        </p:spPr>
+        <p:style>
+          <a:lnRef idx="2">
+            <a:schemeClr val="accent1">
+              <a:shade val="50000"/>
+            </a:schemeClr>
+          </a:lnRef>
+          <a:fillRef idx="1">
+            <a:schemeClr val="accent1"/>
+          </a:fillRef>
+          <a:effectRef idx="0">
+            <a:schemeClr val="accent1"/>
+          </a:effectRef>
+          <a:fontRef idx="minor">
+            <a:schemeClr val="lt1"/>
+          </a:fontRef>
+        </p:style>
+        <p:txBody>
+          <a:bodyPr rtlCol="0" anchor="ctr"/>
+          <a:lstStyle/>
+          <a:p>
+            <a:pPr algn="ctr"/>
+            <a:endParaRPr lang="en-US" dirty="0">
+              <a:solidFill>
+                <a:schemeClr val="tx1"/>
+              </a:solidFill>
+              <a:latin typeface="Arial" panose="020B0604020202020204" pitchFamily="34" charset="0"/>
+            </a:endParaRPr>
+          </a:p>
+        </p:txBody>
+      </p:sp>
+      <p:sp>
+        <p:nvSpPr>
+          <p:cNvPr id="1759" name="Bent Arrow 1758">
+            <a:extLst>
+              <a:ext uri="{FF2B5EF4-FFF2-40B4-BE49-F238E27FC236}">
+                <a16:creationId xmlns:a16="http://schemas.microsoft.com/office/drawing/2014/main" id="{2D63B898-B331-EA45-8B9A-2DB95D553220}"/>
+              </a:ext>
+            </a:extLst>
+          </p:cNvPr>
+          <p:cNvSpPr/>
+          <p:nvPr/>
+        </p:nvSpPr>
+        <p:spPr>
+          <a:xfrm flipV="1">
+            <a:off x="4265816" y="2719008"/>
+            <a:ext cx="247627" cy="81820"/>
+          </a:xfrm>
+          <a:prstGeom prst="bentArrow">
+            <a:avLst>
+              <a:gd name="adj1" fmla="val 25000"/>
+              <a:gd name="adj2" fmla="val 0"/>
+              <a:gd name="adj3" fmla="val 25000"/>
+              <a:gd name="adj4" fmla="val 43750"/>
+            </a:avLst>
+          </a:prstGeom>
+          <a:ln>
+            <a:solidFill>
+              <a:srgbClr val="654D06"/>
+            </a:solidFill>
+          </a:ln>
+          <a:effectLst/>
+        </p:spPr>
+        <p:style>
+          <a:lnRef idx="2">
+            <a:schemeClr val="accent1">
+              <a:shade val="50000"/>
+            </a:schemeClr>
+          </a:lnRef>
+          <a:fillRef idx="1">
+            <a:schemeClr val="accent1"/>
+          </a:fillRef>
+          <a:effectRef idx="0">
+            <a:schemeClr val="accent1"/>
+          </a:effectRef>
+          <a:fontRef idx="minor">
+            <a:schemeClr val="lt1"/>
+          </a:fontRef>
+        </p:style>
+        <p:txBody>
+          <a:bodyPr rtlCol="0" anchor="ctr"/>
+          <a:lstStyle/>
+          <a:p>
+            <a:pPr algn="ctr"/>
+            <a:endParaRPr lang="en-US" dirty="0">
+              <a:solidFill>
+                <a:schemeClr val="tx1"/>
+              </a:solidFill>
+              <a:latin typeface="Arial" panose="020B0604020202020204" pitchFamily="34" charset="0"/>
+            </a:endParaRPr>
+          </a:p>
+        </p:txBody>
+      </p:sp>
+      <p:sp>
+        <p:nvSpPr>
+          <p:cNvPr id="1760" name="Bent Arrow 1759">
+            <a:extLst>
+              <a:ext uri="{FF2B5EF4-FFF2-40B4-BE49-F238E27FC236}">
+                <a16:creationId xmlns:a16="http://schemas.microsoft.com/office/drawing/2014/main" id="{3E16164E-6E8A-F44C-8E8F-2A95CB73071D}"/>
+              </a:ext>
+            </a:extLst>
+          </p:cNvPr>
+          <p:cNvSpPr/>
+          <p:nvPr/>
+        </p:nvSpPr>
+        <p:spPr>
+          <a:xfrm>
+            <a:off x="3424446" y="1942818"/>
+            <a:ext cx="116928" cy="228596"/>
+          </a:xfrm>
+          <a:prstGeom prst="bentArrow">
+            <a:avLst>
+              <a:gd name="adj1" fmla="val 25000"/>
+              <a:gd name="adj2" fmla="val 0"/>
+              <a:gd name="adj3" fmla="val 25000"/>
+              <a:gd name="adj4" fmla="val 43750"/>
+            </a:avLst>
+          </a:prstGeom>
+          <a:ln>
+            <a:solidFill>
+              <a:srgbClr val="654D06"/>
+            </a:solidFill>
+          </a:ln>
+        </p:spPr>
+        <p:style>
+          <a:lnRef idx="2">
+            <a:schemeClr val="accent1">
+              <a:shade val="50000"/>
+            </a:schemeClr>
+          </a:lnRef>
+          <a:fillRef idx="1">
+            <a:schemeClr val="accent1"/>
+          </a:fillRef>
+          <a:effectRef idx="0">
+            <a:schemeClr val="accent1"/>
+          </a:effectRef>
+          <a:fontRef idx="minor">
+            <a:schemeClr val="lt1"/>
+          </a:fontRef>
+        </p:style>
+        <p:txBody>
+          <a:bodyPr rtlCol="0" anchor="ctr"/>
+          <a:lstStyle/>
+          <a:p>
+            <a:pPr algn="ctr"/>
+            <a:endParaRPr lang="en-US" dirty="0">
+              <a:solidFill>
+                <a:schemeClr val="tx1"/>
+              </a:solidFill>
+              <a:latin typeface="Arial" panose="020B0604020202020204" pitchFamily="34" charset="0"/>
+            </a:endParaRPr>
+          </a:p>
+        </p:txBody>
+      </p:sp>
+      <p:sp>
+        <p:nvSpPr>
+          <p:cNvPr id="1761" name="Bent Arrow 1760">
+            <a:extLst>
+              <a:ext uri="{FF2B5EF4-FFF2-40B4-BE49-F238E27FC236}">
+                <a16:creationId xmlns:a16="http://schemas.microsoft.com/office/drawing/2014/main" id="{32E3A66C-4F7A-C143-B683-FF4FEA1E9FD2}"/>
+              </a:ext>
+            </a:extLst>
+          </p:cNvPr>
+          <p:cNvSpPr/>
+          <p:nvPr/>
+        </p:nvSpPr>
+        <p:spPr>
+          <a:xfrm flipV="1">
+            <a:off x="3424448" y="2155218"/>
+            <a:ext cx="178631" cy="211041"/>
+          </a:xfrm>
+          <a:prstGeom prst="bentArrow">
+            <a:avLst>
+              <a:gd name="adj1" fmla="val 25000"/>
+              <a:gd name="adj2" fmla="val 0"/>
+              <a:gd name="adj3" fmla="val 25000"/>
+              <a:gd name="adj4" fmla="val 43750"/>
+            </a:avLst>
+          </a:prstGeom>
+          <a:ln>
+            <a:solidFill>
+              <a:srgbClr val="654D06"/>
+            </a:solidFill>
+          </a:ln>
+        </p:spPr>
+        <p:style>
+          <a:lnRef idx="2">
+            <a:schemeClr val="accent1">
+              <a:shade val="50000"/>
+            </a:schemeClr>
+          </a:lnRef>
+          <a:fillRef idx="1">
+            <a:schemeClr val="accent1"/>
+          </a:fillRef>
+          <a:effectRef idx="0">
+            <a:schemeClr val="accent1"/>
+          </a:effectRef>
+          <a:fontRef idx="minor">
+            <a:schemeClr val="lt1"/>
+          </a:fontRef>
+        </p:style>
+        <p:txBody>
+          <a:bodyPr rtlCol="0" anchor="ctr"/>
+          <a:lstStyle/>
+          <a:p>
+            <a:pPr algn="ctr"/>
+            <a:endParaRPr lang="en-US" dirty="0">
+              <a:solidFill>
+                <a:schemeClr val="tx1"/>
+              </a:solidFill>
+              <a:latin typeface="Arial" panose="020B0604020202020204" pitchFamily="34" charset="0"/>
+            </a:endParaRPr>
+          </a:p>
+        </p:txBody>
+      </p:sp>
       <p:grpSp>
         <p:nvGrpSpPr>
-          <p:cNvPr id="1726" name="Group 1725">
-            <a:extLst>
-              <a:ext uri="{FF2B5EF4-FFF2-40B4-BE49-F238E27FC236}">
-                <a16:creationId xmlns:a16="http://schemas.microsoft.com/office/drawing/2014/main" id="{3CFBDBE0-1AD9-2E43-8A19-AC1F7334F02E}"/>
+          <p:cNvPr id="1762" name="Group 1761">
+            <a:extLst>
+              <a:ext uri="{FF2B5EF4-FFF2-40B4-BE49-F238E27FC236}">
+                <a16:creationId xmlns:a16="http://schemas.microsoft.com/office/drawing/2014/main" id="{4C16DD82-5A3E-2745-8DD1-66D57A7D88B2}"/>
               </a:ext>
             </a:extLst>
           </p:cNvPr>
@@ -27514,19 +29496,19 @@
           <p:nvPr/>
         </p:nvGrpSpPr>
         <p:grpSpPr>
-          <a:xfrm>
-            <a:off x="3074439" y="838101"/>
-            <a:ext cx="1547743" cy="1962727"/>
-            <a:chOff x="6491425" y="3676881"/>
-            <a:chExt cx="1045368" cy="2306361"/>
+          <a:xfrm flipV="1">
+            <a:off x="3545819" y="1851785"/>
+            <a:ext cx="247627" cy="179406"/>
+            <a:chOff x="6809802" y="4868041"/>
+            <a:chExt cx="167251" cy="210816"/>
           </a:xfrm>
         </p:grpSpPr>
         <p:sp>
           <p:nvSpPr>
-            <p:cNvPr id="1727" name="Bent Arrow 1726">
+            <p:cNvPr id="1763" name="Bent Arrow 1762">
               <a:extLst>
                 <a:ext uri="{FF2B5EF4-FFF2-40B4-BE49-F238E27FC236}">
-                  <a16:creationId xmlns:a16="http://schemas.microsoft.com/office/drawing/2014/main" id="{3B6C4D11-AF40-654E-90C5-6685E977A0F1}"/>
+                  <a16:creationId xmlns:a16="http://schemas.microsoft.com/office/drawing/2014/main" id="{C22A389C-F464-6E41-8879-E18CE3B09EC6}"/>
                 </a:ext>
               </a:extLst>
             </p:cNvPr>
@@ -27535,1873 +29517,7 @@
           </p:nvSpPr>
           <p:spPr>
             <a:xfrm>
-              <a:off x="6491682" y="3925304"/>
-              <a:ext cx="419822" cy="504104"/>
-            </a:xfrm>
-            <a:prstGeom prst="bentArrow">
-              <a:avLst>
-                <a:gd name="adj1" fmla="val 0"/>
-                <a:gd name="adj2" fmla="val 0"/>
-                <a:gd name="adj3" fmla="val 25000"/>
-                <a:gd name="adj4" fmla="val 43750"/>
-              </a:avLst>
-            </a:prstGeom>
-            <a:ln>
-              <a:solidFill>
-                <a:srgbClr val="654D06"/>
-              </a:solidFill>
-            </a:ln>
-          </p:spPr>
-          <p:style>
-            <a:lnRef idx="2">
-              <a:schemeClr val="accent1">
-                <a:shade val="50000"/>
-              </a:schemeClr>
-            </a:lnRef>
-            <a:fillRef idx="1">
-              <a:schemeClr val="accent1"/>
-            </a:fillRef>
-            <a:effectRef idx="0">
-              <a:schemeClr val="accent1"/>
-            </a:effectRef>
-            <a:fontRef idx="minor">
-              <a:schemeClr val="lt1"/>
-            </a:fontRef>
-          </p:style>
-          <p:txBody>
-            <a:bodyPr rtlCol="0" anchor="ctr"/>
-            <a:lstStyle/>
-            <a:p>
-              <a:pPr algn="ctr"/>
-              <a:endParaRPr lang="en-US" dirty="0">
-                <a:solidFill>
-                  <a:schemeClr val="tx1"/>
-                </a:solidFill>
-                <a:latin typeface="Arial" panose="020B0604020202020204" pitchFamily="34" charset="0"/>
-              </a:endParaRPr>
-            </a:p>
-          </p:txBody>
-        </p:sp>
-        <p:sp>
-          <p:nvSpPr>
-            <p:cNvPr id="1728" name="Bent Arrow 1727">
-              <a:extLst>
-                <a:ext uri="{FF2B5EF4-FFF2-40B4-BE49-F238E27FC236}">
-                  <a16:creationId xmlns:a16="http://schemas.microsoft.com/office/drawing/2014/main" id="{B596DACF-A207-5447-A768-BCF6616D0574}"/>
-                </a:ext>
-              </a:extLst>
-            </p:cNvPr>
-            <p:cNvSpPr/>
-            <p:nvPr/>
-          </p:nvSpPr>
-          <p:spPr>
-            <a:xfrm flipV="1">
-              <a:off x="6491425" y="4423155"/>
-              <a:ext cx="119378" cy="538115"/>
-            </a:xfrm>
-            <a:prstGeom prst="bentArrow">
-              <a:avLst>
-                <a:gd name="adj1" fmla="val 25000"/>
-                <a:gd name="adj2" fmla="val 0"/>
-                <a:gd name="adj3" fmla="val 25000"/>
-                <a:gd name="adj4" fmla="val 43750"/>
-              </a:avLst>
-            </a:prstGeom>
-            <a:ln>
-              <a:solidFill>
-                <a:srgbClr val="654D06"/>
-              </a:solidFill>
-            </a:ln>
-          </p:spPr>
-          <p:style>
-            <a:lnRef idx="2">
-              <a:schemeClr val="accent1">
-                <a:shade val="50000"/>
-              </a:schemeClr>
-            </a:lnRef>
-            <a:fillRef idx="1">
-              <a:schemeClr val="accent1"/>
-            </a:fillRef>
-            <a:effectRef idx="0">
-              <a:schemeClr val="accent1"/>
-            </a:effectRef>
-            <a:fontRef idx="minor">
-              <a:schemeClr val="lt1"/>
-            </a:fontRef>
-          </p:style>
-          <p:txBody>
-            <a:bodyPr rtlCol="0" anchor="ctr"/>
-            <a:lstStyle/>
-            <a:p>
-              <a:pPr algn="ctr"/>
-              <a:endParaRPr lang="en-US" dirty="0">
-                <a:solidFill>
-                  <a:schemeClr val="tx1"/>
-                </a:solidFill>
-                <a:latin typeface="Arial" panose="020B0604020202020204" pitchFamily="34" charset="0"/>
-              </a:endParaRPr>
-            </a:p>
-          </p:txBody>
-        </p:sp>
-        <p:sp>
-          <p:nvSpPr>
-            <p:cNvPr id="1729" name="Bent Arrow 1728">
-              <a:extLst>
-                <a:ext uri="{FF2B5EF4-FFF2-40B4-BE49-F238E27FC236}">
-                  <a16:creationId xmlns:a16="http://schemas.microsoft.com/office/drawing/2014/main" id="{9A25387D-BFC7-2E44-98B2-E8F4BAA09E7A}"/>
-                </a:ext>
-              </a:extLst>
-            </p:cNvPr>
-            <p:cNvSpPr/>
-            <p:nvPr/>
-          </p:nvSpPr>
-          <p:spPr>
-            <a:xfrm>
-              <a:off x="6605773" y="4474914"/>
-              <a:ext cx="193484" cy="481242"/>
-            </a:xfrm>
-            <a:prstGeom prst="bentArrow">
-              <a:avLst>
-                <a:gd name="adj1" fmla="val 25000"/>
-                <a:gd name="adj2" fmla="val 0"/>
-                <a:gd name="adj3" fmla="val 25000"/>
-                <a:gd name="adj4" fmla="val 43750"/>
-              </a:avLst>
-            </a:prstGeom>
-            <a:ln>
-              <a:solidFill>
-                <a:srgbClr val="654D06"/>
-              </a:solidFill>
-            </a:ln>
-          </p:spPr>
-          <p:style>
-            <a:lnRef idx="2">
-              <a:schemeClr val="accent1">
-                <a:shade val="50000"/>
-              </a:schemeClr>
-            </a:lnRef>
-            <a:fillRef idx="1">
-              <a:schemeClr val="accent1"/>
-            </a:fillRef>
-            <a:effectRef idx="0">
-              <a:schemeClr val="accent1"/>
-            </a:effectRef>
-            <a:fontRef idx="minor">
-              <a:schemeClr val="lt1"/>
-            </a:fontRef>
-          </p:style>
-          <p:txBody>
-            <a:bodyPr rtlCol="0" anchor="ctr"/>
-            <a:lstStyle/>
-            <a:p>
-              <a:pPr algn="ctr"/>
-              <a:endParaRPr lang="en-US" dirty="0">
-                <a:solidFill>
-                  <a:schemeClr val="tx1"/>
-                </a:solidFill>
-                <a:latin typeface="Arial" panose="020B0604020202020204" pitchFamily="34" charset="0"/>
-              </a:endParaRPr>
-            </a:p>
-          </p:txBody>
-        </p:sp>
-        <p:sp>
-          <p:nvSpPr>
-            <p:cNvPr id="1730" name="Bent Arrow 1729">
-              <a:extLst>
-                <a:ext uri="{FF2B5EF4-FFF2-40B4-BE49-F238E27FC236}">
-                  <a16:creationId xmlns:a16="http://schemas.microsoft.com/office/drawing/2014/main" id="{181E32FE-30D9-8E4C-9AE6-083255B727C5}"/>
-                </a:ext>
-              </a:extLst>
-            </p:cNvPr>
-            <p:cNvSpPr/>
-            <p:nvPr/>
-          </p:nvSpPr>
-          <p:spPr>
-            <a:xfrm>
-              <a:off x="6911504" y="3810489"/>
-              <a:ext cx="182974" cy="165670"/>
-            </a:xfrm>
-            <a:prstGeom prst="bentArrow">
-              <a:avLst>
-                <a:gd name="adj1" fmla="val 25000"/>
-                <a:gd name="adj2" fmla="val 0"/>
-                <a:gd name="adj3" fmla="val 25000"/>
-                <a:gd name="adj4" fmla="val 43750"/>
-              </a:avLst>
-            </a:prstGeom>
-            <a:ln>
-              <a:solidFill>
-                <a:srgbClr val="654D06"/>
-              </a:solidFill>
-            </a:ln>
-          </p:spPr>
-          <p:style>
-            <a:lnRef idx="2">
-              <a:schemeClr val="accent1">
-                <a:shade val="50000"/>
-              </a:schemeClr>
-            </a:lnRef>
-            <a:fillRef idx="1">
-              <a:schemeClr val="accent1"/>
-            </a:fillRef>
-            <a:effectRef idx="0">
-              <a:schemeClr val="accent1"/>
-            </a:effectRef>
-            <a:fontRef idx="minor">
-              <a:schemeClr val="lt1"/>
-            </a:fontRef>
-          </p:style>
-          <p:txBody>
-            <a:bodyPr rtlCol="0" anchor="ctr"/>
-            <a:lstStyle/>
-            <a:p>
-              <a:pPr algn="ctr"/>
-              <a:endParaRPr lang="en-US" dirty="0">
-                <a:solidFill>
-                  <a:schemeClr val="tx1"/>
-                </a:solidFill>
-                <a:latin typeface="Arial" panose="020B0604020202020204" pitchFamily="34" charset="0"/>
-              </a:endParaRPr>
-            </a:p>
-          </p:txBody>
-        </p:sp>
-        <p:sp>
-          <p:nvSpPr>
-            <p:cNvPr id="1731" name="Bent Arrow 1730">
-              <a:extLst>
-                <a:ext uri="{FF2B5EF4-FFF2-40B4-BE49-F238E27FC236}">
-                  <a16:creationId xmlns:a16="http://schemas.microsoft.com/office/drawing/2014/main" id="{51D977A3-B737-9740-8A51-A5BB29C4BCEA}"/>
-                </a:ext>
-              </a:extLst>
-            </p:cNvPr>
-            <p:cNvSpPr/>
-            <p:nvPr/>
-          </p:nvSpPr>
-          <p:spPr>
-            <a:xfrm flipV="1">
-              <a:off x="6911504" y="3925054"/>
-              <a:ext cx="241624" cy="145000"/>
-            </a:xfrm>
-            <a:prstGeom prst="bentArrow">
-              <a:avLst>
-                <a:gd name="adj1" fmla="val 25000"/>
-                <a:gd name="adj2" fmla="val 0"/>
-                <a:gd name="adj3" fmla="val 25000"/>
-                <a:gd name="adj4" fmla="val 43750"/>
-              </a:avLst>
-            </a:prstGeom>
-            <a:ln>
-              <a:solidFill>
-                <a:schemeClr val="accent1"/>
-              </a:solidFill>
-            </a:ln>
-          </p:spPr>
-          <p:style>
-            <a:lnRef idx="2">
-              <a:schemeClr val="accent1">
-                <a:shade val="50000"/>
-              </a:schemeClr>
-            </a:lnRef>
-            <a:fillRef idx="1">
-              <a:schemeClr val="accent1"/>
-            </a:fillRef>
-            <a:effectRef idx="0">
-              <a:schemeClr val="accent1"/>
-            </a:effectRef>
-            <a:fontRef idx="minor">
-              <a:schemeClr val="lt1"/>
-            </a:fontRef>
-          </p:style>
-          <p:txBody>
-            <a:bodyPr rtlCol="0" anchor="ctr"/>
-            <a:lstStyle/>
-            <a:p>
-              <a:pPr algn="ctr"/>
-              <a:endParaRPr lang="en-US" dirty="0">
-                <a:solidFill>
-                  <a:schemeClr val="tx1"/>
-                </a:solidFill>
-                <a:latin typeface="Arial" panose="020B0604020202020204" pitchFamily="34" charset="0"/>
-              </a:endParaRPr>
-            </a:p>
-          </p:txBody>
-        </p:sp>
-        <p:sp>
-          <p:nvSpPr>
-            <p:cNvPr id="1732" name="Bent Arrow 1731">
-              <a:extLst>
-                <a:ext uri="{FF2B5EF4-FFF2-40B4-BE49-F238E27FC236}">
-                  <a16:creationId xmlns:a16="http://schemas.microsoft.com/office/drawing/2014/main" id="{E10A032D-B2F7-A340-A486-DA82A944FBC6}"/>
-                </a:ext>
-              </a:extLst>
-            </p:cNvPr>
-            <p:cNvSpPr/>
-            <p:nvPr/>
-          </p:nvSpPr>
-          <p:spPr>
-            <a:xfrm>
-              <a:off x="7098562" y="3676881"/>
-              <a:ext cx="150090" cy="165670"/>
-            </a:xfrm>
-            <a:prstGeom prst="bentArrow">
-              <a:avLst>
-                <a:gd name="adj1" fmla="val 25000"/>
-                <a:gd name="adj2" fmla="val 0"/>
-                <a:gd name="adj3" fmla="val 25000"/>
-                <a:gd name="adj4" fmla="val 43750"/>
-              </a:avLst>
-            </a:prstGeom>
-            <a:ln>
-              <a:solidFill>
-                <a:srgbClr val="654D06"/>
-              </a:solidFill>
-            </a:ln>
-          </p:spPr>
-          <p:style>
-            <a:lnRef idx="2">
-              <a:schemeClr val="accent1">
-                <a:shade val="50000"/>
-              </a:schemeClr>
-            </a:lnRef>
-            <a:fillRef idx="1">
-              <a:schemeClr val="accent1"/>
-            </a:fillRef>
-            <a:effectRef idx="0">
-              <a:schemeClr val="accent1"/>
-            </a:effectRef>
-            <a:fontRef idx="minor">
-              <a:schemeClr val="lt1"/>
-            </a:fontRef>
-          </p:style>
-          <p:txBody>
-            <a:bodyPr rtlCol="0" anchor="ctr"/>
-            <a:lstStyle/>
-            <a:p>
-              <a:pPr algn="ctr"/>
-              <a:endParaRPr lang="en-US" dirty="0">
-                <a:solidFill>
-                  <a:schemeClr val="tx1"/>
-                </a:solidFill>
-                <a:latin typeface="Arial" panose="020B0604020202020204" pitchFamily="34" charset="0"/>
-              </a:endParaRPr>
-            </a:p>
-          </p:txBody>
-        </p:sp>
-        <p:sp>
-          <p:nvSpPr>
-            <p:cNvPr id="1733" name="Bent Arrow 1732">
-              <a:extLst>
-                <a:ext uri="{FF2B5EF4-FFF2-40B4-BE49-F238E27FC236}">
-                  <a16:creationId xmlns:a16="http://schemas.microsoft.com/office/drawing/2014/main" id="{A74EFCB5-5A87-9145-89DD-10BA22942C71}"/>
-                </a:ext>
-              </a:extLst>
-            </p:cNvPr>
-            <p:cNvSpPr/>
-            <p:nvPr/>
-          </p:nvSpPr>
-          <p:spPr>
-            <a:xfrm flipV="1">
-              <a:off x="7098562" y="3791446"/>
-              <a:ext cx="97489" cy="133608"/>
-            </a:xfrm>
-            <a:prstGeom prst="bentArrow">
-              <a:avLst>
-                <a:gd name="adj1" fmla="val 25000"/>
-                <a:gd name="adj2" fmla="val 0"/>
-                <a:gd name="adj3" fmla="val 25000"/>
-                <a:gd name="adj4" fmla="val 43750"/>
-              </a:avLst>
-            </a:prstGeom>
-            <a:ln>
-              <a:solidFill>
-                <a:srgbClr val="654D06"/>
-              </a:solidFill>
-            </a:ln>
-          </p:spPr>
-          <p:style>
-            <a:lnRef idx="2">
-              <a:schemeClr val="accent1">
-                <a:shade val="50000"/>
-              </a:schemeClr>
-            </a:lnRef>
-            <a:fillRef idx="1">
-              <a:schemeClr val="accent1"/>
-            </a:fillRef>
-            <a:effectRef idx="0">
-              <a:schemeClr val="accent1"/>
-            </a:effectRef>
-            <a:fontRef idx="minor">
-              <a:schemeClr val="lt1"/>
-            </a:fontRef>
-          </p:style>
-          <p:txBody>
-            <a:bodyPr rtlCol="0" anchor="ctr"/>
-            <a:lstStyle/>
-            <a:p>
-              <a:pPr algn="ctr"/>
-              <a:endParaRPr lang="en-US" dirty="0">
-                <a:solidFill>
-                  <a:schemeClr val="tx1"/>
-                </a:solidFill>
-                <a:latin typeface="Arial" panose="020B0604020202020204" pitchFamily="34" charset="0"/>
-              </a:endParaRPr>
-            </a:p>
-          </p:txBody>
-        </p:sp>
-        <p:sp>
-          <p:nvSpPr>
-            <p:cNvPr id="1734" name="Oval 1733">
-              <a:extLst>
-                <a:ext uri="{FF2B5EF4-FFF2-40B4-BE49-F238E27FC236}">
-                  <a16:creationId xmlns:a16="http://schemas.microsoft.com/office/drawing/2014/main" id="{8B0E0B25-C227-384F-84A7-5400764AF0C1}"/>
-                </a:ext>
-              </a:extLst>
-            </p:cNvPr>
-            <p:cNvSpPr>
-              <a:spLocks/>
-            </p:cNvSpPr>
-            <p:nvPr/>
-          </p:nvSpPr>
-          <p:spPr>
-            <a:xfrm>
-              <a:off x="7306582" y="4429408"/>
-              <a:ext cx="43232" cy="75215"/>
-            </a:xfrm>
-            <a:prstGeom prst="ellipse">
-              <a:avLst/>
-            </a:prstGeom>
-            <a:solidFill>
-              <a:schemeClr val="accent1"/>
-            </a:solidFill>
-            <a:ln w="0">
-              <a:noFill/>
-            </a:ln>
-          </p:spPr>
-          <p:style>
-            <a:lnRef idx="2">
-              <a:schemeClr val="accent1">
-                <a:shade val="50000"/>
-              </a:schemeClr>
-            </a:lnRef>
-            <a:fillRef idx="1">
-              <a:schemeClr val="accent1"/>
-            </a:fillRef>
-            <a:effectRef idx="0">
-              <a:schemeClr val="accent1"/>
-            </a:effectRef>
-            <a:fontRef idx="minor">
-              <a:schemeClr val="lt1"/>
-            </a:fontRef>
-          </p:style>
-          <p:txBody>
-            <a:bodyPr rtlCol="0" anchor="ctr"/>
-            <a:lstStyle/>
-            <a:p>
-              <a:pPr algn="just"/>
-              <a:endParaRPr lang="en-US" dirty="0">
-                <a:latin typeface="Arial" panose="020B0604020202020204" pitchFamily="34" charset="0"/>
-              </a:endParaRPr>
-            </a:p>
-          </p:txBody>
-        </p:sp>
-        <p:sp>
-          <p:nvSpPr>
-            <p:cNvPr id="1735" name="Bent Arrow 1734">
-              <a:extLst>
-                <a:ext uri="{FF2B5EF4-FFF2-40B4-BE49-F238E27FC236}">
-                  <a16:creationId xmlns:a16="http://schemas.microsoft.com/office/drawing/2014/main" id="{B13A4C4B-9B89-354A-9B82-E8A31874F840}"/>
-                </a:ext>
-              </a:extLst>
-            </p:cNvPr>
-            <p:cNvSpPr/>
-            <p:nvPr/>
-          </p:nvSpPr>
-          <p:spPr>
-            <a:xfrm flipV="1">
-              <a:off x="6792921" y="4471652"/>
-              <a:ext cx="280855" cy="203258"/>
-            </a:xfrm>
-            <a:prstGeom prst="bentArrow">
-              <a:avLst>
-                <a:gd name="adj1" fmla="val 25000"/>
-                <a:gd name="adj2" fmla="val 0"/>
-                <a:gd name="adj3" fmla="val 25000"/>
-                <a:gd name="adj4" fmla="val 43750"/>
-              </a:avLst>
-            </a:prstGeom>
-            <a:ln>
-              <a:solidFill>
-                <a:srgbClr val="654D06"/>
-              </a:solidFill>
-            </a:ln>
-          </p:spPr>
-          <p:style>
-            <a:lnRef idx="2">
-              <a:schemeClr val="accent1">
-                <a:shade val="50000"/>
-              </a:schemeClr>
-            </a:lnRef>
-            <a:fillRef idx="1">
-              <a:schemeClr val="accent1"/>
-            </a:fillRef>
-            <a:effectRef idx="0">
-              <a:schemeClr val="accent1"/>
-            </a:effectRef>
-            <a:fontRef idx="minor">
-              <a:schemeClr val="lt1"/>
-            </a:fontRef>
-          </p:style>
-          <p:txBody>
-            <a:bodyPr rtlCol="0" anchor="ctr"/>
-            <a:lstStyle/>
-            <a:p>
-              <a:pPr algn="just"/>
-              <a:endParaRPr lang="en-US" dirty="0">
-                <a:solidFill>
-                  <a:schemeClr val="tx1"/>
-                </a:solidFill>
-                <a:latin typeface="Arial" panose="020B0604020202020204" pitchFamily="34" charset="0"/>
-              </a:endParaRPr>
-            </a:p>
-          </p:txBody>
-        </p:sp>
-        <p:sp>
-          <p:nvSpPr>
-            <p:cNvPr id="1736" name="Bent Arrow 1735">
-              <a:extLst>
-                <a:ext uri="{FF2B5EF4-FFF2-40B4-BE49-F238E27FC236}">
-                  <a16:creationId xmlns:a16="http://schemas.microsoft.com/office/drawing/2014/main" id="{4ECDB97A-0253-AF4F-8200-0EB40B28785B}"/>
-                </a:ext>
-              </a:extLst>
-            </p:cNvPr>
-            <p:cNvSpPr/>
-            <p:nvPr/>
-          </p:nvSpPr>
-          <p:spPr>
-            <a:xfrm>
-              <a:off x="6794026" y="4257838"/>
-              <a:ext cx="102741" cy="213897"/>
-            </a:xfrm>
-            <a:prstGeom prst="bentArrow">
-              <a:avLst>
-                <a:gd name="adj1" fmla="val 25000"/>
-                <a:gd name="adj2" fmla="val 0"/>
-                <a:gd name="adj3" fmla="val 25000"/>
-                <a:gd name="adj4" fmla="val 43750"/>
-              </a:avLst>
-            </a:prstGeom>
-            <a:ln>
-              <a:solidFill>
-                <a:srgbClr val="FF0000"/>
-              </a:solidFill>
-            </a:ln>
-          </p:spPr>
-          <p:style>
-            <a:lnRef idx="2">
-              <a:schemeClr val="accent1">
-                <a:shade val="50000"/>
-              </a:schemeClr>
-            </a:lnRef>
-            <a:fillRef idx="1">
-              <a:schemeClr val="accent1"/>
-            </a:fillRef>
-            <a:effectRef idx="0">
-              <a:schemeClr val="accent1"/>
-            </a:effectRef>
-            <a:fontRef idx="minor">
-              <a:schemeClr val="lt1"/>
-            </a:fontRef>
-          </p:style>
-          <p:txBody>
-            <a:bodyPr rtlCol="0" anchor="ctr"/>
-            <a:lstStyle/>
-            <a:p>
-              <a:pPr algn="ctr"/>
-              <a:endParaRPr lang="en-US" dirty="0">
-                <a:solidFill>
-                  <a:schemeClr val="tx1"/>
-                </a:solidFill>
-                <a:latin typeface="Arial" panose="020B0604020202020204" pitchFamily="34" charset="0"/>
-              </a:endParaRPr>
-            </a:p>
-          </p:txBody>
-        </p:sp>
-        <p:sp>
-          <p:nvSpPr>
-            <p:cNvPr id="1737" name="Bent Arrow 1736">
-              <a:extLst>
-                <a:ext uri="{FF2B5EF4-FFF2-40B4-BE49-F238E27FC236}">
-                  <a16:creationId xmlns:a16="http://schemas.microsoft.com/office/drawing/2014/main" id="{710BE3FA-558D-DD41-863E-C41BC093ADF9}"/>
-                </a:ext>
-              </a:extLst>
-            </p:cNvPr>
-            <p:cNvSpPr/>
-            <p:nvPr/>
-          </p:nvSpPr>
-          <p:spPr>
-            <a:xfrm>
-              <a:off x="6896767" y="4142659"/>
-              <a:ext cx="451015" cy="112064"/>
-            </a:xfrm>
-            <a:prstGeom prst="bentArrow">
-              <a:avLst>
-                <a:gd name="adj1" fmla="val 25000"/>
-                <a:gd name="adj2" fmla="val 0"/>
-                <a:gd name="adj3" fmla="val 25000"/>
-                <a:gd name="adj4" fmla="val 43750"/>
-              </a:avLst>
-            </a:prstGeom>
-            <a:ln>
-              <a:solidFill>
-                <a:srgbClr val="654D06"/>
-              </a:solidFill>
-            </a:ln>
-          </p:spPr>
-          <p:style>
-            <a:lnRef idx="2">
-              <a:schemeClr val="accent1">
-                <a:shade val="50000"/>
-              </a:schemeClr>
-            </a:lnRef>
-            <a:fillRef idx="1">
-              <a:schemeClr val="accent1"/>
-            </a:fillRef>
-            <a:effectRef idx="0">
-              <a:schemeClr val="accent1"/>
-            </a:effectRef>
-            <a:fontRef idx="minor">
-              <a:schemeClr val="lt1"/>
-            </a:fontRef>
-          </p:style>
-          <p:txBody>
-            <a:bodyPr rtlCol="0" anchor="ctr"/>
-            <a:lstStyle/>
-            <a:p>
-              <a:pPr algn="ctr"/>
-              <a:endParaRPr lang="en-US" dirty="0">
-                <a:solidFill>
-                  <a:schemeClr val="tx1"/>
-                </a:solidFill>
-                <a:latin typeface="Arial" panose="020B0604020202020204" pitchFamily="34" charset="0"/>
-              </a:endParaRPr>
-            </a:p>
-          </p:txBody>
-        </p:sp>
-        <p:sp>
-          <p:nvSpPr>
-            <p:cNvPr id="1738" name="Bent Arrow 1737">
-              <a:extLst>
-                <a:ext uri="{FF2B5EF4-FFF2-40B4-BE49-F238E27FC236}">
-                  <a16:creationId xmlns:a16="http://schemas.microsoft.com/office/drawing/2014/main" id="{E1B03FCC-9A79-F64F-8204-8B26A78E2B63}"/>
-                </a:ext>
-              </a:extLst>
-            </p:cNvPr>
-            <p:cNvSpPr/>
-            <p:nvPr/>
-          </p:nvSpPr>
-          <p:spPr>
-            <a:xfrm flipV="1">
-              <a:off x="6896767" y="4257226"/>
-              <a:ext cx="291055" cy="93405"/>
-            </a:xfrm>
-            <a:prstGeom prst="bentArrow">
-              <a:avLst>
-                <a:gd name="adj1" fmla="val 25000"/>
-                <a:gd name="adj2" fmla="val 0"/>
-                <a:gd name="adj3" fmla="val 25000"/>
-                <a:gd name="adj4" fmla="val 43750"/>
-              </a:avLst>
-            </a:prstGeom>
-            <a:ln>
-              <a:solidFill>
-                <a:srgbClr val="654D06"/>
-              </a:solidFill>
-            </a:ln>
-          </p:spPr>
-          <p:style>
-            <a:lnRef idx="2">
-              <a:schemeClr val="accent1">
-                <a:shade val="50000"/>
-              </a:schemeClr>
-            </a:lnRef>
-            <a:fillRef idx="1">
-              <a:schemeClr val="accent1"/>
-            </a:fillRef>
-            <a:effectRef idx="0">
-              <a:schemeClr val="accent1"/>
-            </a:effectRef>
-            <a:fontRef idx="minor">
-              <a:schemeClr val="lt1"/>
-            </a:fontRef>
-          </p:style>
-          <p:txBody>
-            <a:bodyPr rtlCol="0" anchor="ctr"/>
-            <a:lstStyle/>
-            <a:p>
-              <a:pPr algn="ctr"/>
-              <a:endParaRPr lang="en-US" dirty="0">
-                <a:solidFill>
-                  <a:schemeClr val="tx1"/>
-                </a:solidFill>
-                <a:latin typeface="Arial" panose="020B0604020202020204" pitchFamily="34" charset="0"/>
-              </a:endParaRPr>
-            </a:p>
-          </p:txBody>
-        </p:sp>
-        <p:sp>
-          <p:nvSpPr>
-            <p:cNvPr id="1739" name="Bent Arrow 1738">
-              <a:extLst>
-                <a:ext uri="{FF2B5EF4-FFF2-40B4-BE49-F238E27FC236}">
-                  <a16:creationId xmlns:a16="http://schemas.microsoft.com/office/drawing/2014/main" id="{BFDE8BB9-B21F-E14F-9040-9882B234CC22}"/>
-                </a:ext>
-              </a:extLst>
-            </p:cNvPr>
-            <p:cNvSpPr/>
-            <p:nvPr/>
-          </p:nvSpPr>
-          <p:spPr>
-            <a:xfrm>
-              <a:off x="7073776" y="4545022"/>
-              <a:ext cx="111172" cy="165670"/>
-            </a:xfrm>
-            <a:prstGeom prst="bentArrow">
-              <a:avLst>
-                <a:gd name="adj1" fmla="val 25000"/>
-                <a:gd name="adj2" fmla="val 0"/>
-                <a:gd name="adj3" fmla="val 25000"/>
-                <a:gd name="adj4" fmla="val 43750"/>
-              </a:avLst>
-            </a:prstGeom>
-            <a:ln>
-              <a:solidFill>
-                <a:srgbClr val="0070C0"/>
-              </a:solidFill>
-            </a:ln>
-          </p:spPr>
-          <p:style>
-            <a:lnRef idx="2">
-              <a:schemeClr val="accent1">
-                <a:shade val="50000"/>
-              </a:schemeClr>
-            </a:lnRef>
-            <a:fillRef idx="1">
-              <a:schemeClr val="accent1"/>
-            </a:fillRef>
-            <a:effectRef idx="0">
-              <a:schemeClr val="accent1"/>
-            </a:effectRef>
-            <a:fontRef idx="minor">
-              <a:schemeClr val="lt1"/>
-            </a:fontRef>
-          </p:style>
-          <p:txBody>
-            <a:bodyPr rtlCol="0" anchor="ctr"/>
-            <a:lstStyle/>
-            <a:p>
-              <a:pPr algn="just"/>
-              <a:endParaRPr lang="en-US" dirty="0">
-                <a:solidFill>
-                  <a:schemeClr val="tx1"/>
-                </a:solidFill>
-                <a:latin typeface="Arial" panose="020B0604020202020204" pitchFamily="34" charset="0"/>
-              </a:endParaRPr>
-            </a:p>
-          </p:txBody>
-        </p:sp>
-        <p:sp>
-          <p:nvSpPr>
-            <p:cNvPr id="1740" name="Bent Arrow 1739">
-              <a:extLst>
-                <a:ext uri="{FF2B5EF4-FFF2-40B4-BE49-F238E27FC236}">
-                  <a16:creationId xmlns:a16="http://schemas.microsoft.com/office/drawing/2014/main" id="{C304AF07-7DC4-2E47-AD48-438773FD22D5}"/>
-                </a:ext>
-              </a:extLst>
-            </p:cNvPr>
-            <p:cNvSpPr/>
-            <p:nvPr/>
-          </p:nvSpPr>
-          <p:spPr>
-            <a:xfrm flipV="1">
-              <a:off x="7073776" y="4659587"/>
-              <a:ext cx="201626" cy="145000"/>
-            </a:xfrm>
-            <a:prstGeom prst="bentArrow">
-              <a:avLst>
-                <a:gd name="adj1" fmla="val 25000"/>
-                <a:gd name="adj2" fmla="val 0"/>
-                <a:gd name="adj3" fmla="val 25000"/>
-                <a:gd name="adj4" fmla="val 43750"/>
-              </a:avLst>
-            </a:prstGeom>
-            <a:ln>
-              <a:solidFill>
-                <a:srgbClr val="654D06"/>
-              </a:solidFill>
-            </a:ln>
-          </p:spPr>
-          <p:style>
-            <a:lnRef idx="2">
-              <a:schemeClr val="accent1">
-                <a:shade val="50000"/>
-              </a:schemeClr>
-            </a:lnRef>
-            <a:fillRef idx="1">
-              <a:schemeClr val="accent1"/>
-            </a:fillRef>
-            <a:effectRef idx="0">
-              <a:schemeClr val="accent1"/>
-            </a:effectRef>
-            <a:fontRef idx="minor">
-              <a:schemeClr val="lt1"/>
-            </a:fontRef>
-          </p:style>
-          <p:txBody>
-            <a:bodyPr rtlCol="0" anchor="ctr"/>
-            <a:lstStyle/>
-            <a:p>
-              <a:pPr algn="just"/>
-              <a:endParaRPr lang="en-US" dirty="0">
-                <a:solidFill>
-                  <a:schemeClr val="tx1"/>
-                </a:solidFill>
-                <a:latin typeface="Arial" panose="020B0604020202020204" pitchFamily="34" charset="0"/>
-              </a:endParaRPr>
-            </a:p>
-          </p:txBody>
-        </p:sp>
-        <p:sp>
-          <p:nvSpPr>
-            <p:cNvPr id="1741" name="Bent Arrow 1740">
-              <a:extLst>
-                <a:ext uri="{FF2B5EF4-FFF2-40B4-BE49-F238E27FC236}">
-                  <a16:creationId xmlns:a16="http://schemas.microsoft.com/office/drawing/2014/main" id="{BF0DF807-4775-4A48-9C8C-D8A0514437BF}"/>
-                </a:ext>
-              </a:extLst>
-            </p:cNvPr>
-            <p:cNvSpPr/>
-            <p:nvPr/>
-          </p:nvSpPr>
-          <p:spPr>
-            <a:xfrm>
-              <a:off x="7186055" y="4455008"/>
-              <a:ext cx="125607" cy="122076"/>
-            </a:xfrm>
-            <a:prstGeom prst="bentArrow">
-              <a:avLst>
-                <a:gd name="adj1" fmla="val 25000"/>
-                <a:gd name="adj2" fmla="val 0"/>
-                <a:gd name="adj3" fmla="val 25000"/>
-                <a:gd name="adj4" fmla="val 43750"/>
-              </a:avLst>
-            </a:prstGeom>
-            <a:ln>
-              <a:solidFill>
-                <a:srgbClr val="0070C0"/>
-              </a:solidFill>
-            </a:ln>
-          </p:spPr>
-          <p:style>
-            <a:lnRef idx="2">
-              <a:schemeClr val="accent1">
-                <a:shade val="50000"/>
-              </a:schemeClr>
-            </a:lnRef>
-            <a:fillRef idx="1">
-              <a:schemeClr val="accent1"/>
-            </a:fillRef>
-            <a:effectRef idx="0">
-              <a:schemeClr val="accent1"/>
-            </a:effectRef>
-            <a:fontRef idx="minor">
-              <a:schemeClr val="lt1"/>
-            </a:fontRef>
-          </p:style>
-          <p:txBody>
-            <a:bodyPr rtlCol="0" anchor="ctr"/>
-            <a:lstStyle/>
-            <a:p>
-              <a:pPr algn="just"/>
-              <a:endParaRPr lang="en-US" dirty="0">
-                <a:solidFill>
-                  <a:schemeClr val="tx1"/>
-                </a:solidFill>
-                <a:latin typeface="Arial" panose="020B0604020202020204" pitchFamily="34" charset="0"/>
-              </a:endParaRPr>
-            </a:p>
-          </p:txBody>
-        </p:sp>
-        <p:sp>
-          <p:nvSpPr>
-            <p:cNvPr id="1742" name="Bent Arrow 1741">
-              <a:extLst>
-                <a:ext uri="{FF2B5EF4-FFF2-40B4-BE49-F238E27FC236}">
-                  <a16:creationId xmlns:a16="http://schemas.microsoft.com/office/drawing/2014/main" id="{4EBF0EA1-F76C-224E-91FD-133E23E3AC3D}"/>
-                </a:ext>
-              </a:extLst>
-            </p:cNvPr>
-            <p:cNvSpPr/>
-            <p:nvPr/>
-          </p:nvSpPr>
-          <p:spPr>
-            <a:xfrm flipV="1">
-              <a:off x="7186053" y="4525979"/>
-              <a:ext cx="188568" cy="119799"/>
-            </a:xfrm>
-            <a:prstGeom prst="bentArrow">
-              <a:avLst>
-                <a:gd name="adj1" fmla="val 25000"/>
-                <a:gd name="adj2" fmla="val 0"/>
-                <a:gd name="adj3" fmla="val 25000"/>
-                <a:gd name="adj4" fmla="val 43750"/>
-              </a:avLst>
-            </a:prstGeom>
-            <a:ln>
-              <a:solidFill>
-                <a:srgbClr val="0070C0"/>
-              </a:solidFill>
-            </a:ln>
-          </p:spPr>
-          <p:style>
-            <a:lnRef idx="2">
-              <a:schemeClr val="accent1">
-                <a:shade val="50000"/>
-              </a:schemeClr>
-            </a:lnRef>
-            <a:fillRef idx="1">
-              <a:schemeClr val="accent1"/>
-            </a:fillRef>
-            <a:effectRef idx="0">
-              <a:schemeClr val="accent1"/>
-            </a:effectRef>
-            <a:fontRef idx="minor">
-              <a:schemeClr val="lt1"/>
-            </a:fontRef>
-          </p:style>
-          <p:txBody>
-            <a:bodyPr rtlCol="0" anchor="ctr"/>
-            <a:lstStyle/>
-            <a:p>
-              <a:pPr algn="just"/>
-              <a:endParaRPr lang="en-US" dirty="0">
-                <a:solidFill>
-                  <a:schemeClr val="tx1"/>
-                </a:solidFill>
-                <a:latin typeface="Arial" panose="020B0604020202020204" pitchFamily="34" charset="0"/>
-              </a:endParaRPr>
-            </a:p>
-          </p:txBody>
-        </p:sp>
-        <p:sp>
-          <p:nvSpPr>
-            <p:cNvPr id="1743" name="Oval 1742">
-              <a:extLst>
-                <a:ext uri="{FF2B5EF4-FFF2-40B4-BE49-F238E27FC236}">
-                  <a16:creationId xmlns:a16="http://schemas.microsoft.com/office/drawing/2014/main" id="{B6FFB062-449A-A346-95CA-35480B1F2AE7}"/>
-                </a:ext>
-              </a:extLst>
-            </p:cNvPr>
-            <p:cNvSpPr>
-              <a:spLocks/>
-            </p:cNvSpPr>
-            <p:nvPr/>
-          </p:nvSpPr>
-          <p:spPr>
-            <a:xfrm>
-              <a:off x="7352856" y="4615005"/>
-              <a:ext cx="43232" cy="75215"/>
-            </a:xfrm>
-            <a:prstGeom prst="ellipse">
-              <a:avLst/>
-            </a:prstGeom>
-            <a:solidFill>
-              <a:schemeClr val="accent1"/>
-            </a:solidFill>
-            <a:ln w="0">
-              <a:noFill/>
-            </a:ln>
-          </p:spPr>
-          <p:style>
-            <a:lnRef idx="2">
-              <a:schemeClr val="accent1">
-                <a:shade val="50000"/>
-              </a:schemeClr>
-            </a:lnRef>
-            <a:fillRef idx="1">
-              <a:schemeClr val="accent1"/>
-            </a:fillRef>
-            <a:effectRef idx="0">
-              <a:schemeClr val="accent1"/>
-            </a:effectRef>
-            <a:fontRef idx="minor">
-              <a:schemeClr val="lt1"/>
-            </a:fontRef>
-          </p:style>
-          <p:txBody>
-            <a:bodyPr rtlCol="0" anchor="ctr"/>
-            <a:lstStyle/>
-            <a:p>
-              <a:pPr algn="just"/>
-              <a:endParaRPr lang="en-US" dirty="0">
-                <a:latin typeface="Arial" panose="020B0604020202020204" pitchFamily="34" charset="0"/>
-              </a:endParaRPr>
-            </a:p>
-          </p:txBody>
-        </p:sp>
-        <p:sp>
-          <p:nvSpPr>
-            <p:cNvPr id="1744" name="Oval 1743">
-              <a:extLst>
-                <a:ext uri="{FF2B5EF4-FFF2-40B4-BE49-F238E27FC236}">
-                  <a16:creationId xmlns:a16="http://schemas.microsoft.com/office/drawing/2014/main" id="{468FD30D-602D-6940-A355-26E452D369BB}"/>
-                </a:ext>
-              </a:extLst>
-            </p:cNvPr>
-            <p:cNvSpPr>
-              <a:spLocks/>
-            </p:cNvSpPr>
-            <p:nvPr/>
-          </p:nvSpPr>
-          <p:spPr>
-            <a:xfrm>
-              <a:off x="7127977" y="4039629"/>
-              <a:ext cx="43232" cy="75215"/>
-            </a:xfrm>
-            <a:prstGeom prst="ellipse">
-              <a:avLst/>
-            </a:prstGeom>
-            <a:solidFill>
-              <a:schemeClr val="accent1"/>
-            </a:solidFill>
-            <a:ln w="0">
-              <a:noFill/>
-            </a:ln>
-          </p:spPr>
-          <p:style>
-            <a:lnRef idx="2">
-              <a:schemeClr val="accent1">
-                <a:shade val="50000"/>
-              </a:schemeClr>
-            </a:lnRef>
-            <a:fillRef idx="1">
-              <a:schemeClr val="accent1"/>
-            </a:fillRef>
-            <a:effectRef idx="0">
-              <a:schemeClr val="accent1"/>
-            </a:effectRef>
-            <a:fontRef idx="minor">
-              <a:schemeClr val="lt1"/>
-            </a:fontRef>
-          </p:style>
-          <p:txBody>
-            <a:bodyPr rtlCol="0" anchor="ctr"/>
-            <a:lstStyle/>
-            <a:p>
-              <a:pPr algn="just"/>
-              <a:endParaRPr lang="en-US" dirty="0">
-                <a:latin typeface="Arial" panose="020B0604020202020204" pitchFamily="34" charset="0"/>
-              </a:endParaRPr>
-            </a:p>
-          </p:txBody>
-        </p:sp>
-        <p:sp>
-          <p:nvSpPr>
-            <p:cNvPr id="1745" name="Bent Arrow 1744">
-              <a:extLst>
-                <a:ext uri="{FF2B5EF4-FFF2-40B4-BE49-F238E27FC236}">
-                  <a16:creationId xmlns:a16="http://schemas.microsoft.com/office/drawing/2014/main" id="{535A94EB-6C65-044D-8C15-03C8DDB95D23}"/>
-                </a:ext>
-              </a:extLst>
-            </p:cNvPr>
-            <p:cNvSpPr/>
-            <p:nvPr/>
-          </p:nvSpPr>
-          <p:spPr>
-            <a:xfrm flipV="1">
-              <a:off x="6606464" y="4961270"/>
-              <a:ext cx="117427" cy="283507"/>
-            </a:xfrm>
-            <a:prstGeom prst="bentArrow">
-              <a:avLst>
-                <a:gd name="adj1" fmla="val 25000"/>
-                <a:gd name="adj2" fmla="val 0"/>
-                <a:gd name="adj3" fmla="val 25000"/>
-                <a:gd name="adj4" fmla="val 35544"/>
-              </a:avLst>
-            </a:prstGeom>
-            <a:ln>
-              <a:solidFill>
-                <a:srgbClr val="654D06"/>
-              </a:solidFill>
-            </a:ln>
-          </p:spPr>
-          <p:style>
-            <a:lnRef idx="2">
-              <a:schemeClr val="accent1">
-                <a:shade val="50000"/>
-              </a:schemeClr>
-            </a:lnRef>
-            <a:fillRef idx="1">
-              <a:schemeClr val="accent1"/>
-            </a:fillRef>
-            <a:effectRef idx="0">
-              <a:schemeClr val="accent1"/>
-            </a:effectRef>
-            <a:fontRef idx="minor">
-              <a:schemeClr val="lt1"/>
-            </a:fontRef>
-          </p:style>
-          <p:txBody>
-            <a:bodyPr rtlCol="0" anchor="ctr"/>
-            <a:lstStyle/>
-            <a:p>
-              <a:pPr algn="ctr"/>
-              <a:endParaRPr lang="en-US" dirty="0">
-                <a:solidFill>
-                  <a:schemeClr val="tx1"/>
-                </a:solidFill>
-                <a:latin typeface="Arial" panose="020B0604020202020204" pitchFamily="34" charset="0"/>
-              </a:endParaRPr>
-            </a:p>
-          </p:txBody>
-        </p:sp>
-        <p:sp>
-          <p:nvSpPr>
-            <p:cNvPr id="1746" name="Bent Arrow 1745">
-              <a:extLst>
-                <a:ext uri="{FF2B5EF4-FFF2-40B4-BE49-F238E27FC236}">
-                  <a16:creationId xmlns:a16="http://schemas.microsoft.com/office/drawing/2014/main" id="{935F49F3-8823-E34C-8547-48DF01A2FD63}"/>
-                </a:ext>
-              </a:extLst>
-            </p:cNvPr>
-            <p:cNvSpPr/>
-            <p:nvPr/>
-          </p:nvSpPr>
-          <p:spPr>
-            <a:xfrm>
-              <a:off x="6842125" y="5282373"/>
-              <a:ext cx="158774" cy="231131"/>
-            </a:xfrm>
-            <a:prstGeom prst="bentArrow">
-              <a:avLst>
-                <a:gd name="adj1" fmla="val 25000"/>
-                <a:gd name="adj2" fmla="val 0"/>
-                <a:gd name="adj3" fmla="val 25000"/>
-                <a:gd name="adj4" fmla="val 43750"/>
-              </a:avLst>
-            </a:prstGeom>
-            <a:ln>
-              <a:solidFill>
-                <a:srgbClr val="654D06"/>
-              </a:solidFill>
-            </a:ln>
-          </p:spPr>
-          <p:style>
-            <a:lnRef idx="2">
-              <a:schemeClr val="accent1">
-                <a:shade val="50000"/>
-              </a:schemeClr>
-            </a:lnRef>
-            <a:fillRef idx="1">
-              <a:schemeClr val="accent1"/>
-            </a:fillRef>
-            <a:effectRef idx="0">
-              <a:schemeClr val="accent1"/>
-            </a:effectRef>
-            <a:fontRef idx="minor">
-              <a:schemeClr val="lt1"/>
-            </a:fontRef>
-          </p:style>
-          <p:txBody>
-            <a:bodyPr rtlCol="0" anchor="ctr"/>
-            <a:lstStyle/>
-            <a:p>
-              <a:pPr algn="ctr"/>
-              <a:endParaRPr lang="en-US" dirty="0">
-                <a:solidFill>
-                  <a:schemeClr val="tx1"/>
-                </a:solidFill>
-                <a:latin typeface="Arial" panose="020B0604020202020204" pitchFamily="34" charset="0"/>
-              </a:endParaRPr>
-            </a:p>
-          </p:txBody>
-        </p:sp>
-        <p:sp>
-          <p:nvSpPr>
-            <p:cNvPr id="1747" name="Bent Arrow 1746">
-              <a:extLst>
-                <a:ext uri="{FF2B5EF4-FFF2-40B4-BE49-F238E27FC236}">
-                  <a16:creationId xmlns:a16="http://schemas.microsoft.com/office/drawing/2014/main" id="{D700FFCA-C444-FB49-997E-A447811E24EF}"/>
-                </a:ext>
-              </a:extLst>
-            </p:cNvPr>
-            <p:cNvSpPr/>
-            <p:nvPr/>
-          </p:nvSpPr>
-          <p:spPr>
-            <a:xfrm flipV="1">
-              <a:off x="6842125" y="5494474"/>
-              <a:ext cx="275485" cy="247990"/>
-            </a:xfrm>
-            <a:prstGeom prst="bentArrow">
-              <a:avLst>
-                <a:gd name="adj1" fmla="val 25000"/>
-                <a:gd name="adj2" fmla="val 0"/>
-                <a:gd name="adj3" fmla="val 25000"/>
-                <a:gd name="adj4" fmla="val 43750"/>
-              </a:avLst>
-            </a:prstGeom>
-            <a:ln>
-              <a:solidFill>
-                <a:srgbClr val="654D06"/>
-              </a:solidFill>
-            </a:ln>
-          </p:spPr>
-          <p:style>
-            <a:lnRef idx="2">
-              <a:schemeClr val="accent1">
-                <a:shade val="50000"/>
-              </a:schemeClr>
-            </a:lnRef>
-            <a:fillRef idx="1">
-              <a:schemeClr val="accent1"/>
-            </a:fillRef>
-            <a:effectRef idx="0">
-              <a:schemeClr val="accent1"/>
-            </a:effectRef>
-            <a:fontRef idx="minor">
-              <a:schemeClr val="lt1"/>
-            </a:fontRef>
-          </p:style>
-          <p:txBody>
-            <a:bodyPr rtlCol="0" anchor="ctr"/>
-            <a:lstStyle/>
-            <a:p>
-              <a:pPr algn="ctr"/>
-              <a:endParaRPr lang="en-US" dirty="0">
-                <a:solidFill>
-                  <a:schemeClr val="tx1"/>
-                </a:solidFill>
-                <a:latin typeface="Arial" panose="020B0604020202020204" pitchFamily="34" charset="0"/>
-              </a:endParaRPr>
-            </a:p>
-          </p:txBody>
-        </p:sp>
-        <p:sp>
-          <p:nvSpPr>
-            <p:cNvPr id="1748" name="Bent Arrow 1747">
-              <a:extLst>
-                <a:ext uri="{FF2B5EF4-FFF2-40B4-BE49-F238E27FC236}">
-                  <a16:creationId xmlns:a16="http://schemas.microsoft.com/office/drawing/2014/main" id="{4F2C05CD-E065-7D4C-BB4F-C281807368A4}"/>
-                </a:ext>
-              </a:extLst>
-            </p:cNvPr>
-            <p:cNvSpPr/>
-            <p:nvPr/>
-          </p:nvSpPr>
-          <p:spPr>
-            <a:xfrm flipV="1">
-              <a:off x="7117610" y="5750381"/>
-              <a:ext cx="178201" cy="139243"/>
-            </a:xfrm>
-            <a:prstGeom prst="bentArrow">
-              <a:avLst>
-                <a:gd name="adj1" fmla="val 25000"/>
-                <a:gd name="adj2" fmla="val 0"/>
-                <a:gd name="adj3" fmla="val 25000"/>
-                <a:gd name="adj4" fmla="val 43750"/>
-              </a:avLst>
-            </a:prstGeom>
-            <a:ln>
-              <a:solidFill>
-                <a:srgbClr val="654D06"/>
-              </a:solidFill>
-            </a:ln>
-          </p:spPr>
-          <p:style>
-            <a:lnRef idx="2">
-              <a:schemeClr val="accent1">
-                <a:shade val="50000"/>
-              </a:schemeClr>
-            </a:lnRef>
-            <a:fillRef idx="1">
-              <a:schemeClr val="accent1"/>
-            </a:fillRef>
-            <a:effectRef idx="0">
-              <a:schemeClr val="accent1"/>
-            </a:effectRef>
-            <a:fontRef idx="minor">
-              <a:schemeClr val="lt1"/>
-            </a:fontRef>
-          </p:style>
-          <p:txBody>
-            <a:bodyPr rtlCol="0" anchor="ctr"/>
-            <a:lstStyle/>
-            <a:p>
-              <a:pPr algn="ctr"/>
-              <a:endParaRPr lang="en-US" dirty="0">
-                <a:solidFill>
-                  <a:schemeClr val="tx1"/>
-                </a:solidFill>
-                <a:latin typeface="Arial" panose="020B0604020202020204" pitchFamily="34" charset="0"/>
-              </a:endParaRPr>
-            </a:p>
-          </p:txBody>
-        </p:sp>
-        <p:sp>
-          <p:nvSpPr>
-            <p:cNvPr id="1749" name="Bent Arrow 1748">
-              <a:extLst>
-                <a:ext uri="{FF2B5EF4-FFF2-40B4-BE49-F238E27FC236}">
-                  <a16:creationId xmlns:a16="http://schemas.microsoft.com/office/drawing/2014/main" id="{FC823AEA-6AD6-4145-B280-B14BAA8B394E}"/>
-                </a:ext>
-              </a:extLst>
-            </p:cNvPr>
-            <p:cNvSpPr/>
-            <p:nvPr/>
-          </p:nvSpPr>
-          <p:spPr>
-            <a:xfrm>
-              <a:off x="7000288" y="5161791"/>
-              <a:ext cx="62458" cy="131110"/>
-            </a:xfrm>
-            <a:prstGeom prst="bentArrow">
-              <a:avLst>
-                <a:gd name="adj1" fmla="val 25000"/>
-                <a:gd name="adj2" fmla="val 0"/>
-                <a:gd name="adj3" fmla="val 25000"/>
-                <a:gd name="adj4" fmla="val 43750"/>
-              </a:avLst>
-            </a:prstGeom>
-            <a:ln>
-              <a:solidFill>
-                <a:srgbClr val="654D06"/>
-              </a:solidFill>
-            </a:ln>
-          </p:spPr>
-          <p:style>
-            <a:lnRef idx="2">
-              <a:schemeClr val="accent1">
-                <a:shade val="50000"/>
-              </a:schemeClr>
-            </a:lnRef>
-            <a:fillRef idx="1">
-              <a:schemeClr val="accent1"/>
-            </a:fillRef>
-            <a:effectRef idx="0">
-              <a:schemeClr val="accent1"/>
-            </a:effectRef>
-            <a:fontRef idx="minor">
-              <a:schemeClr val="lt1"/>
-            </a:fontRef>
-          </p:style>
-          <p:txBody>
-            <a:bodyPr rtlCol="0" anchor="ctr"/>
-            <a:lstStyle/>
-            <a:p>
-              <a:pPr algn="ctr"/>
-              <a:endParaRPr lang="en-US" dirty="0">
-                <a:solidFill>
-                  <a:schemeClr val="tx1"/>
-                </a:solidFill>
-                <a:latin typeface="Arial" panose="020B0604020202020204" pitchFamily="34" charset="0"/>
-              </a:endParaRPr>
-            </a:p>
-          </p:txBody>
-        </p:sp>
-        <p:sp>
-          <p:nvSpPr>
-            <p:cNvPr id="1750" name="Bent Arrow 1749">
-              <a:extLst>
-                <a:ext uri="{FF2B5EF4-FFF2-40B4-BE49-F238E27FC236}">
-                  <a16:creationId xmlns:a16="http://schemas.microsoft.com/office/drawing/2014/main" id="{24E00B88-E9EA-A249-86BC-A238D0CDA245}"/>
-                </a:ext>
-              </a:extLst>
-            </p:cNvPr>
-            <p:cNvSpPr/>
-            <p:nvPr/>
-          </p:nvSpPr>
-          <p:spPr>
-            <a:xfrm flipV="1">
-              <a:off x="7000288" y="5285416"/>
-              <a:ext cx="303939" cy="96131"/>
-            </a:xfrm>
-            <a:prstGeom prst="bentArrow">
-              <a:avLst>
-                <a:gd name="adj1" fmla="val 25000"/>
-                <a:gd name="adj2" fmla="val 0"/>
-                <a:gd name="adj3" fmla="val 25000"/>
-                <a:gd name="adj4" fmla="val 43750"/>
-              </a:avLst>
-            </a:prstGeom>
-            <a:ln>
-              <a:solidFill>
-                <a:srgbClr val="654D06"/>
-              </a:solidFill>
-            </a:ln>
-          </p:spPr>
-          <p:style>
-            <a:lnRef idx="2">
-              <a:schemeClr val="accent1">
-                <a:shade val="50000"/>
-              </a:schemeClr>
-            </a:lnRef>
-            <a:fillRef idx="1">
-              <a:schemeClr val="accent1"/>
-            </a:fillRef>
-            <a:effectRef idx="0">
-              <a:schemeClr val="accent1"/>
-            </a:effectRef>
-            <a:fontRef idx="minor">
-              <a:schemeClr val="lt1"/>
-            </a:fontRef>
-          </p:style>
-          <p:txBody>
-            <a:bodyPr rtlCol="0" anchor="ctr"/>
-            <a:lstStyle/>
-            <a:p>
-              <a:pPr algn="ctr"/>
-              <a:endParaRPr lang="en-US" dirty="0">
-                <a:solidFill>
-                  <a:schemeClr val="tx1"/>
-                </a:solidFill>
-                <a:latin typeface="Arial" panose="020B0604020202020204" pitchFamily="34" charset="0"/>
-              </a:endParaRPr>
-            </a:p>
-          </p:txBody>
-        </p:sp>
-        <p:sp>
-          <p:nvSpPr>
-            <p:cNvPr id="1751" name="Bent Arrow 1750">
-              <a:extLst>
-                <a:ext uri="{FF2B5EF4-FFF2-40B4-BE49-F238E27FC236}">
-                  <a16:creationId xmlns:a16="http://schemas.microsoft.com/office/drawing/2014/main" id="{82328816-B331-2743-AE7F-5054DA82FA95}"/>
-                </a:ext>
-              </a:extLst>
-            </p:cNvPr>
-            <p:cNvSpPr/>
-            <p:nvPr/>
-          </p:nvSpPr>
-          <p:spPr>
-            <a:xfrm>
-              <a:off x="7068950" y="5098065"/>
-              <a:ext cx="192172" cy="64497"/>
-            </a:xfrm>
-            <a:prstGeom prst="bentArrow">
-              <a:avLst>
-                <a:gd name="adj1" fmla="val 25000"/>
-                <a:gd name="adj2" fmla="val 0"/>
-                <a:gd name="adj3" fmla="val 25000"/>
-                <a:gd name="adj4" fmla="val 43750"/>
-              </a:avLst>
-            </a:prstGeom>
-            <a:ln>
-              <a:solidFill>
-                <a:srgbClr val="654D06"/>
-              </a:solidFill>
-            </a:ln>
-          </p:spPr>
-          <p:style>
-            <a:lnRef idx="2">
-              <a:schemeClr val="accent1">
-                <a:shade val="50000"/>
-              </a:schemeClr>
-            </a:lnRef>
-            <a:fillRef idx="1">
-              <a:schemeClr val="accent1"/>
-            </a:fillRef>
-            <a:effectRef idx="0">
-              <a:schemeClr val="accent1"/>
-            </a:effectRef>
-            <a:fontRef idx="minor">
-              <a:schemeClr val="lt1"/>
-            </a:fontRef>
-          </p:style>
-          <p:txBody>
-            <a:bodyPr rtlCol="0" anchor="ctr"/>
-            <a:lstStyle/>
-            <a:p>
-              <a:pPr algn="ctr"/>
-              <a:endParaRPr lang="en-US" dirty="0">
-                <a:solidFill>
-                  <a:schemeClr val="tx1"/>
-                </a:solidFill>
-                <a:latin typeface="Arial" panose="020B0604020202020204" pitchFamily="34" charset="0"/>
-              </a:endParaRPr>
-            </a:p>
-          </p:txBody>
-        </p:sp>
-        <p:sp>
-          <p:nvSpPr>
-            <p:cNvPr id="1752" name="Bent Arrow 1751">
-              <a:extLst>
-                <a:ext uri="{FF2B5EF4-FFF2-40B4-BE49-F238E27FC236}">
-                  <a16:creationId xmlns:a16="http://schemas.microsoft.com/office/drawing/2014/main" id="{44AEEE66-8674-E54A-833B-8F17BD536EA1}"/>
-                </a:ext>
-              </a:extLst>
-            </p:cNvPr>
-            <p:cNvSpPr/>
-            <p:nvPr/>
-          </p:nvSpPr>
-          <p:spPr>
-            <a:xfrm flipV="1">
-              <a:off x="7067877" y="5157645"/>
-              <a:ext cx="232791" cy="66685"/>
-            </a:xfrm>
-            <a:prstGeom prst="bentArrow">
-              <a:avLst>
-                <a:gd name="adj1" fmla="val 25000"/>
-                <a:gd name="adj2" fmla="val 0"/>
-                <a:gd name="adj3" fmla="val 25000"/>
-                <a:gd name="adj4" fmla="val 43750"/>
-              </a:avLst>
-            </a:prstGeom>
-            <a:ln>
-              <a:solidFill>
-                <a:srgbClr val="654D06"/>
-              </a:solidFill>
-            </a:ln>
-          </p:spPr>
-          <p:style>
-            <a:lnRef idx="2">
-              <a:schemeClr val="accent1">
-                <a:shade val="50000"/>
-              </a:schemeClr>
-            </a:lnRef>
-            <a:fillRef idx="1">
-              <a:schemeClr val="accent1"/>
-            </a:fillRef>
-            <a:effectRef idx="0">
-              <a:schemeClr val="accent1"/>
-            </a:effectRef>
-            <a:fontRef idx="minor">
-              <a:schemeClr val="lt1"/>
-            </a:fontRef>
-          </p:style>
-          <p:txBody>
-            <a:bodyPr rtlCol="0" anchor="ctr"/>
-            <a:lstStyle/>
-            <a:p>
-              <a:pPr algn="ctr"/>
-              <a:endParaRPr lang="en-US" dirty="0">
-                <a:solidFill>
-                  <a:schemeClr val="tx1"/>
-                </a:solidFill>
-                <a:latin typeface="Arial" panose="020B0604020202020204" pitchFamily="34" charset="0"/>
-              </a:endParaRPr>
-            </a:p>
-          </p:txBody>
-        </p:sp>
-        <p:sp>
-          <p:nvSpPr>
-            <p:cNvPr id="1753" name="Bent Arrow 1752">
-              <a:extLst>
-                <a:ext uri="{FF2B5EF4-FFF2-40B4-BE49-F238E27FC236}">
-                  <a16:creationId xmlns:a16="http://schemas.microsoft.com/office/drawing/2014/main" id="{07341747-54A0-674F-85BB-F0E4E5A70C11}"/>
-                </a:ext>
-              </a:extLst>
-            </p:cNvPr>
-            <p:cNvSpPr/>
-            <p:nvPr/>
-          </p:nvSpPr>
-          <p:spPr>
-            <a:xfrm>
-              <a:off x="7117610" y="5587233"/>
-              <a:ext cx="161257" cy="167162"/>
-            </a:xfrm>
-            <a:prstGeom prst="bentArrow">
-              <a:avLst>
-                <a:gd name="adj1" fmla="val 25000"/>
-                <a:gd name="adj2" fmla="val 0"/>
-                <a:gd name="adj3" fmla="val 25000"/>
-                <a:gd name="adj4" fmla="val 43750"/>
-              </a:avLst>
-            </a:prstGeom>
-            <a:ln>
-              <a:solidFill>
-                <a:srgbClr val="0070C0"/>
-              </a:solidFill>
-            </a:ln>
-          </p:spPr>
-          <p:style>
-            <a:lnRef idx="2">
-              <a:schemeClr val="accent1">
-                <a:shade val="50000"/>
-              </a:schemeClr>
-            </a:lnRef>
-            <a:fillRef idx="1">
-              <a:schemeClr val="accent1"/>
-            </a:fillRef>
-            <a:effectRef idx="0">
-              <a:schemeClr val="accent1"/>
-            </a:effectRef>
-            <a:fontRef idx="minor">
-              <a:schemeClr val="lt1"/>
-            </a:fontRef>
-          </p:style>
-          <p:txBody>
-            <a:bodyPr rtlCol="0" anchor="ctr"/>
-            <a:lstStyle/>
-            <a:p>
-              <a:pPr algn="just"/>
-              <a:endParaRPr lang="en-US" dirty="0">
-                <a:solidFill>
-                  <a:schemeClr val="tx1"/>
-                </a:solidFill>
-                <a:latin typeface="Arial" panose="020B0604020202020204" pitchFamily="34" charset="0"/>
-              </a:endParaRPr>
-            </a:p>
-          </p:txBody>
-        </p:sp>
-        <p:sp>
-          <p:nvSpPr>
-            <p:cNvPr id="1754" name="Bent Arrow 1753">
-              <a:extLst>
-                <a:ext uri="{FF2B5EF4-FFF2-40B4-BE49-F238E27FC236}">
-                  <a16:creationId xmlns:a16="http://schemas.microsoft.com/office/drawing/2014/main" id="{EC3B9A25-D5F3-5042-B1A8-62AD84274171}"/>
-                </a:ext>
-              </a:extLst>
-            </p:cNvPr>
-            <p:cNvSpPr/>
-            <p:nvPr/>
-          </p:nvSpPr>
-          <p:spPr>
-            <a:xfrm>
-              <a:off x="7277267" y="5484296"/>
-              <a:ext cx="192172" cy="138634"/>
-            </a:xfrm>
-            <a:prstGeom prst="bentArrow">
-              <a:avLst>
-                <a:gd name="adj1" fmla="val 25000"/>
-                <a:gd name="adj2" fmla="val 0"/>
-                <a:gd name="adj3" fmla="val 25000"/>
-                <a:gd name="adj4" fmla="val 43750"/>
-              </a:avLst>
-            </a:prstGeom>
-            <a:ln>
-              <a:solidFill>
-                <a:srgbClr val="0070C0"/>
-              </a:solidFill>
-            </a:ln>
-          </p:spPr>
-          <p:style>
-            <a:lnRef idx="2">
-              <a:schemeClr val="accent1">
-                <a:shade val="50000"/>
-              </a:schemeClr>
-            </a:lnRef>
-            <a:fillRef idx="1">
-              <a:schemeClr val="accent1"/>
-            </a:fillRef>
-            <a:effectRef idx="0">
-              <a:schemeClr val="accent1"/>
-            </a:effectRef>
-            <a:fontRef idx="minor">
-              <a:schemeClr val="lt1"/>
-            </a:fontRef>
-          </p:style>
-          <p:txBody>
-            <a:bodyPr rtlCol="0" anchor="ctr"/>
-            <a:lstStyle/>
-            <a:p>
-              <a:pPr algn="just"/>
-              <a:endParaRPr lang="en-US" dirty="0">
-                <a:solidFill>
-                  <a:schemeClr val="tx1"/>
-                </a:solidFill>
-                <a:latin typeface="Arial" panose="020B0604020202020204" pitchFamily="34" charset="0"/>
-              </a:endParaRPr>
-            </a:p>
-          </p:txBody>
-        </p:sp>
-        <p:sp>
-          <p:nvSpPr>
-            <p:cNvPr id="1755" name="Bent Arrow 1754">
-              <a:extLst>
-                <a:ext uri="{FF2B5EF4-FFF2-40B4-BE49-F238E27FC236}">
-                  <a16:creationId xmlns:a16="http://schemas.microsoft.com/office/drawing/2014/main" id="{853F339A-8808-B44A-8E94-226F54C76469}"/>
-                </a:ext>
-              </a:extLst>
-            </p:cNvPr>
-            <p:cNvSpPr/>
-            <p:nvPr/>
-          </p:nvSpPr>
-          <p:spPr>
-            <a:xfrm flipV="1">
-              <a:off x="7277266" y="5571823"/>
-              <a:ext cx="232791" cy="91721"/>
-            </a:xfrm>
-            <a:prstGeom prst="bentArrow">
-              <a:avLst>
-                <a:gd name="adj1" fmla="val 25000"/>
-                <a:gd name="adj2" fmla="val 0"/>
-                <a:gd name="adj3" fmla="val 25000"/>
-                <a:gd name="adj4" fmla="val 43750"/>
-              </a:avLst>
-            </a:prstGeom>
-            <a:ln>
-              <a:solidFill>
-                <a:srgbClr val="0070C0"/>
-              </a:solidFill>
-            </a:ln>
-          </p:spPr>
-          <p:style>
-            <a:lnRef idx="2">
-              <a:schemeClr val="accent1">
-                <a:shade val="50000"/>
-              </a:schemeClr>
-            </a:lnRef>
-            <a:fillRef idx="1">
-              <a:schemeClr val="accent1"/>
-            </a:fillRef>
-            <a:effectRef idx="0">
-              <a:schemeClr val="accent1"/>
-            </a:effectRef>
-            <a:fontRef idx="minor">
-              <a:schemeClr val="lt1"/>
-            </a:fontRef>
-          </p:style>
-          <p:txBody>
-            <a:bodyPr rtlCol="0" anchor="ctr"/>
-            <a:lstStyle/>
-            <a:p>
-              <a:pPr algn="just"/>
-              <a:endParaRPr lang="en-US" dirty="0">
-                <a:solidFill>
-                  <a:schemeClr val="tx1"/>
-                </a:solidFill>
-                <a:latin typeface="Arial" panose="020B0604020202020204" pitchFamily="34" charset="0"/>
-              </a:endParaRPr>
-            </a:p>
-          </p:txBody>
-        </p:sp>
-        <p:sp>
-          <p:nvSpPr>
-            <p:cNvPr id="1756" name="Oval 1755">
-              <a:extLst>
-                <a:ext uri="{FF2B5EF4-FFF2-40B4-BE49-F238E27FC236}">
-                  <a16:creationId xmlns:a16="http://schemas.microsoft.com/office/drawing/2014/main" id="{427B8C09-DFFF-774D-B93A-386456E610F7}"/>
-                </a:ext>
-              </a:extLst>
-            </p:cNvPr>
-            <p:cNvSpPr>
-              <a:spLocks/>
-            </p:cNvSpPr>
-            <p:nvPr/>
-          </p:nvSpPr>
-          <p:spPr>
-            <a:xfrm>
-              <a:off x="7448339" y="5454039"/>
-              <a:ext cx="43232" cy="75215"/>
-            </a:xfrm>
-            <a:prstGeom prst="ellipse">
-              <a:avLst/>
-            </a:prstGeom>
-            <a:solidFill>
-              <a:schemeClr val="accent1"/>
-            </a:solidFill>
-            <a:ln w="0">
-              <a:noFill/>
-            </a:ln>
-          </p:spPr>
-          <p:style>
-            <a:lnRef idx="2">
-              <a:schemeClr val="accent1">
-                <a:shade val="50000"/>
-              </a:schemeClr>
-            </a:lnRef>
-            <a:fillRef idx="1">
-              <a:schemeClr val="accent1"/>
-            </a:fillRef>
-            <a:effectRef idx="0">
-              <a:schemeClr val="accent1"/>
-            </a:effectRef>
-            <a:fontRef idx="minor">
-              <a:schemeClr val="lt1"/>
-            </a:fontRef>
-          </p:style>
-          <p:txBody>
-            <a:bodyPr rtlCol="0" anchor="ctr"/>
-            <a:lstStyle/>
-            <a:p>
-              <a:pPr algn="just"/>
-              <a:endParaRPr lang="en-US" dirty="0">
-                <a:latin typeface="Arial" panose="020B0604020202020204" pitchFamily="34" charset="0"/>
-              </a:endParaRPr>
-            </a:p>
-          </p:txBody>
-        </p:sp>
-        <p:sp>
-          <p:nvSpPr>
-            <p:cNvPr id="1757" name="Oval 1756">
-              <a:extLst>
-                <a:ext uri="{FF2B5EF4-FFF2-40B4-BE49-F238E27FC236}">
-                  <a16:creationId xmlns:a16="http://schemas.microsoft.com/office/drawing/2014/main" id="{B5C4FA84-4A41-5141-88B0-AC3C7752E151}"/>
-                </a:ext>
-              </a:extLst>
-            </p:cNvPr>
-            <p:cNvSpPr>
-              <a:spLocks/>
-            </p:cNvSpPr>
-            <p:nvPr/>
-          </p:nvSpPr>
-          <p:spPr>
-            <a:xfrm>
-              <a:off x="7493561" y="5639083"/>
-              <a:ext cx="43232" cy="75215"/>
-            </a:xfrm>
-            <a:prstGeom prst="ellipse">
-              <a:avLst/>
-            </a:prstGeom>
-            <a:solidFill>
-              <a:schemeClr val="accent1"/>
-            </a:solidFill>
-            <a:ln w="0">
-              <a:noFill/>
-            </a:ln>
-          </p:spPr>
-          <p:style>
-            <a:lnRef idx="2">
-              <a:schemeClr val="accent1">
-                <a:shade val="50000"/>
-              </a:schemeClr>
-            </a:lnRef>
-            <a:fillRef idx="1">
-              <a:schemeClr val="accent1"/>
-            </a:fillRef>
-            <a:effectRef idx="0">
-              <a:schemeClr val="accent1"/>
-            </a:effectRef>
-            <a:fontRef idx="minor">
-              <a:schemeClr val="lt1"/>
-            </a:fontRef>
-          </p:style>
-          <p:txBody>
-            <a:bodyPr rtlCol="0" anchor="ctr"/>
-            <a:lstStyle/>
-            <a:p>
-              <a:pPr algn="just"/>
-              <a:endParaRPr lang="en-US" dirty="0">
-                <a:latin typeface="Arial" panose="020B0604020202020204" pitchFamily="34" charset="0"/>
-              </a:endParaRPr>
-            </a:p>
-          </p:txBody>
-        </p:sp>
-        <p:sp>
-          <p:nvSpPr>
-            <p:cNvPr id="1758" name="Bent Arrow 1757">
-              <a:extLst>
-                <a:ext uri="{FF2B5EF4-FFF2-40B4-BE49-F238E27FC236}">
-                  <a16:creationId xmlns:a16="http://schemas.microsoft.com/office/drawing/2014/main" id="{8835CA71-084A-E64C-B411-6BB8BD19E09C}"/>
-                </a:ext>
-              </a:extLst>
-            </p:cNvPr>
-            <p:cNvSpPr/>
-            <p:nvPr/>
-          </p:nvSpPr>
-          <p:spPr>
-            <a:xfrm>
-              <a:off x="7296098" y="5772426"/>
+              <a:off x="6809803" y="4868041"/>
               <a:ext cx="104320" cy="115789"/>
             </a:xfrm>
             <a:prstGeom prst="bentArrow">
@@ -29451,10 +29567,10 @@
         </p:sp>
         <p:sp>
           <p:nvSpPr>
-            <p:cNvPr id="1759" name="Bent Arrow 1758">
+            <p:cNvPr id="1764" name="Bent Arrow 1763">
               <a:extLst>
                 <a:ext uri="{FF2B5EF4-FFF2-40B4-BE49-F238E27FC236}">
-                  <a16:creationId xmlns:a16="http://schemas.microsoft.com/office/drawing/2014/main" id="{2D63B898-B331-EA45-8B9A-2DB95D553220}"/>
+                  <a16:creationId xmlns:a16="http://schemas.microsoft.com/office/drawing/2014/main" id="{3E0CABAB-FE8B-5147-8876-43471BFCDF4B}"/>
                 </a:ext>
               </a:extLst>
             </p:cNvPr>
@@ -29463,7 +29579,7 @@
           </p:nvSpPr>
           <p:spPr>
             <a:xfrm flipV="1">
-              <a:off x="7296098" y="5887097"/>
+              <a:off x="6809802" y="4982712"/>
               <a:ext cx="167251" cy="96145"/>
             </a:xfrm>
             <a:prstGeom prst="bentArrow">
@@ -29511,273 +29627,6 @@
             </a:p>
           </p:txBody>
         </p:sp>
-        <p:sp>
-          <p:nvSpPr>
-            <p:cNvPr id="1760" name="Bent Arrow 1759">
-              <a:extLst>
-                <a:ext uri="{FF2B5EF4-FFF2-40B4-BE49-F238E27FC236}">
-                  <a16:creationId xmlns:a16="http://schemas.microsoft.com/office/drawing/2014/main" id="{3E16164E-6E8A-F44C-8E8F-2A95CB73071D}"/>
-                </a:ext>
-              </a:extLst>
-            </p:cNvPr>
-            <p:cNvSpPr/>
-            <p:nvPr/>
-          </p:nvSpPr>
-          <p:spPr>
-            <a:xfrm>
-              <a:off x="6727825" y="4975012"/>
-              <a:ext cx="78975" cy="268618"/>
-            </a:xfrm>
-            <a:prstGeom prst="bentArrow">
-              <a:avLst>
-                <a:gd name="adj1" fmla="val 25000"/>
-                <a:gd name="adj2" fmla="val 0"/>
-                <a:gd name="adj3" fmla="val 25000"/>
-                <a:gd name="adj4" fmla="val 43750"/>
-              </a:avLst>
-            </a:prstGeom>
-            <a:ln>
-              <a:solidFill>
-                <a:srgbClr val="654D06"/>
-              </a:solidFill>
-            </a:ln>
-          </p:spPr>
-          <p:style>
-            <a:lnRef idx="2">
-              <a:schemeClr val="accent1">
-                <a:shade val="50000"/>
-              </a:schemeClr>
-            </a:lnRef>
-            <a:fillRef idx="1">
-              <a:schemeClr val="accent1"/>
-            </a:fillRef>
-            <a:effectRef idx="0">
-              <a:schemeClr val="accent1"/>
-            </a:effectRef>
-            <a:fontRef idx="minor">
-              <a:schemeClr val="lt1"/>
-            </a:fontRef>
-          </p:style>
-          <p:txBody>
-            <a:bodyPr rtlCol="0" anchor="ctr"/>
-            <a:lstStyle/>
-            <a:p>
-              <a:pPr algn="ctr"/>
-              <a:endParaRPr lang="en-US" dirty="0">
-                <a:solidFill>
-                  <a:schemeClr val="tx1"/>
-                </a:solidFill>
-                <a:latin typeface="Arial" panose="020B0604020202020204" pitchFamily="34" charset="0"/>
-              </a:endParaRPr>
-            </a:p>
-          </p:txBody>
-        </p:sp>
-        <p:sp>
-          <p:nvSpPr>
-            <p:cNvPr id="1761" name="Bent Arrow 1760">
-              <a:extLst>
-                <a:ext uri="{FF2B5EF4-FFF2-40B4-BE49-F238E27FC236}">
-                  <a16:creationId xmlns:a16="http://schemas.microsoft.com/office/drawing/2014/main" id="{32E3A66C-4F7A-C143-B683-FF4FEA1E9FD2}"/>
-                </a:ext>
-              </a:extLst>
-            </p:cNvPr>
-            <p:cNvSpPr/>
-            <p:nvPr/>
-          </p:nvSpPr>
-          <p:spPr>
-            <a:xfrm flipV="1">
-              <a:off x="6727826" y="5224599"/>
-              <a:ext cx="120650" cy="247990"/>
-            </a:xfrm>
-            <a:prstGeom prst="bentArrow">
-              <a:avLst>
-                <a:gd name="adj1" fmla="val 25000"/>
-                <a:gd name="adj2" fmla="val 0"/>
-                <a:gd name="adj3" fmla="val 25000"/>
-                <a:gd name="adj4" fmla="val 43750"/>
-              </a:avLst>
-            </a:prstGeom>
-            <a:ln>
-              <a:solidFill>
-                <a:srgbClr val="654D06"/>
-              </a:solidFill>
-            </a:ln>
-          </p:spPr>
-          <p:style>
-            <a:lnRef idx="2">
-              <a:schemeClr val="accent1">
-                <a:shade val="50000"/>
-              </a:schemeClr>
-            </a:lnRef>
-            <a:fillRef idx="1">
-              <a:schemeClr val="accent1"/>
-            </a:fillRef>
-            <a:effectRef idx="0">
-              <a:schemeClr val="accent1"/>
-            </a:effectRef>
-            <a:fontRef idx="minor">
-              <a:schemeClr val="lt1"/>
-            </a:fontRef>
-          </p:style>
-          <p:txBody>
-            <a:bodyPr rtlCol="0" anchor="ctr"/>
-            <a:lstStyle/>
-            <a:p>
-              <a:pPr algn="ctr"/>
-              <a:endParaRPr lang="en-US" dirty="0">
-                <a:solidFill>
-                  <a:schemeClr val="tx1"/>
-                </a:solidFill>
-                <a:latin typeface="Arial" panose="020B0604020202020204" pitchFamily="34" charset="0"/>
-              </a:endParaRPr>
-            </a:p>
-          </p:txBody>
-        </p:sp>
-        <p:grpSp>
-          <p:nvGrpSpPr>
-            <p:cNvPr id="1762" name="Group 1761">
-              <a:extLst>
-                <a:ext uri="{FF2B5EF4-FFF2-40B4-BE49-F238E27FC236}">
-                  <a16:creationId xmlns:a16="http://schemas.microsoft.com/office/drawing/2014/main" id="{4C16DD82-5A3E-2745-8DD1-66D57A7D88B2}"/>
-                </a:ext>
-              </a:extLst>
-            </p:cNvPr>
-            <p:cNvGrpSpPr/>
-            <p:nvPr/>
-          </p:nvGrpSpPr>
-          <p:grpSpPr>
-            <a:xfrm flipV="1">
-              <a:off x="6809802" y="4868041"/>
-              <a:ext cx="167251" cy="210816"/>
-              <a:chOff x="6809802" y="4868041"/>
-              <a:chExt cx="167251" cy="210816"/>
-            </a:xfrm>
-          </p:grpSpPr>
-          <p:sp>
-            <p:nvSpPr>
-              <p:cNvPr id="1763" name="Bent Arrow 1762">
-                <a:extLst>
-                  <a:ext uri="{FF2B5EF4-FFF2-40B4-BE49-F238E27FC236}">
-                    <a16:creationId xmlns:a16="http://schemas.microsoft.com/office/drawing/2014/main" id="{C22A389C-F464-6E41-8879-E18CE3B09EC6}"/>
-                  </a:ext>
-                </a:extLst>
-              </p:cNvPr>
-              <p:cNvSpPr/>
-              <p:nvPr/>
-            </p:nvSpPr>
-            <p:spPr>
-              <a:xfrm>
-                <a:off x="6809803" y="4868041"/>
-                <a:ext cx="104320" cy="115789"/>
-              </a:xfrm>
-              <a:prstGeom prst="bentArrow">
-                <a:avLst>
-                  <a:gd name="adj1" fmla="val 25000"/>
-                  <a:gd name="adj2" fmla="val 0"/>
-                  <a:gd name="adj3" fmla="val 25000"/>
-                  <a:gd name="adj4" fmla="val 43750"/>
-                </a:avLst>
-              </a:prstGeom>
-              <a:ln>
-                <a:solidFill>
-                  <a:srgbClr val="654D06"/>
-                </a:solidFill>
-              </a:ln>
-              <a:effectLst/>
-            </p:spPr>
-            <p:style>
-              <a:lnRef idx="2">
-                <a:schemeClr val="accent1">
-                  <a:shade val="50000"/>
-                </a:schemeClr>
-              </a:lnRef>
-              <a:fillRef idx="1">
-                <a:schemeClr val="accent1"/>
-              </a:fillRef>
-              <a:effectRef idx="0">
-                <a:schemeClr val="accent1"/>
-              </a:effectRef>
-              <a:fontRef idx="minor">
-                <a:schemeClr val="lt1"/>
-              </a:fontRef>
-            </p:style>
-            <p:txBody>
-              <a:bodyPr rtlCol="0" anchor="ctr"/>
-              <a:lstStyle/>
-              <a:p>
-                <a:pPr algn="ctr"/>
-                <a:endParaRPr lang="en-US" dirty="0">
-                  <a:solidFill>
-                    <a:schemeClr val="tx1"/>
-                  </a:solidFill>
-                  <a:latin typeface="Arial" panose="020B0604020202020204" pitchFamily="34" charset="0"/>
-                </a:endParaRPr>
-              </a:p>
-            </p:txBody>
-          </p:sp>
-          <p:sp>
-            <p:nvSpPr>
-              <p:cNvPr id="1764" name="Bent Arrow 1763">
-                <a:extLst>
-                  <a:ext uri="{FF2B5EF4-FFF2-40B4-BE49-F238E27FC236}">
-                    <a16:creationId xmlns:a16="http://schemas.microsoft.com/office/drawing/2014/main" id="{3E0CABAB-FE8B-5147-8876-43471BFCDF4B}"/>
-                  </a:ext>
-                </a:extLst>
-              </p:cNvPr>
-              <p:cNvSpPr/>
-              <p:nvPr/>
-            </p:nvSpPr>
-            <p:spPr>
-              <a:xfrm flipV="1">
-                <a:off x="6809802" y="4982712"/>
-                <a:ext cx="167251" cy="96145"/>
-              </a:xfrm>
-              <a:prstGeom prst="bentArrow">
-                <a:avLst>
-                  <a:gd name="adj1" fmla="val 25000"/>
-                  <a:gd name="adj2" fmla="val 0"/>
-                  <a:gd name="adj3" fmla="val 25000"/>
-                  <a:gd name="adj4" fmla="val 43750"/>
-                </a:avLst>
-              </a:prstGeom>
-              <a:ln>
-                <a:solidFill>
-                  <a:srgbClr val="654D06"/>
-                </a:solidFill>
-              </a:ln>
-              <a:effectLst/>
-            </p:spPr>
-            <p:style>
-              <a:lnRef idx="2">
-                <a:schemeClr val="accent1">
-                  <a:shade val="50000"/>
-                </a:schemeClr>
-              </a:lnRef>
-              <a:fillRef idx="1">
-                <a:schemeClr val="accent1"/>
-              </a:fillRef>
-              <a:effectRef idx="0">
-                <a:schemeClr val="accent1"/>
-              </a:effectRef>
-              <a:fontRef idx="minor">
-                <a:schemeClr val="lt1"/>
-              </a:fontRef>
-            </p:style>
-            <p:txBody>
-              <a:bodyPr rtlCol="0" anchor="ctr"/>
-              <a:lstStyle/>
-              <a:p>
-                <a:pPr algn="ctr"/>
-                <a:endParaRPr lang="en-US" dirty="0">
-                  <a:solidFill>
-                    <a:schemeClr val="tx1"/>
-                  </a:solidFill>
-                  <a:latin typeface="Arial" panose="020B0604020202020204" pitchFamily="34" charset="0"/>
-                </a:endParaRPr>
-              </a:p>
-            </p:txBody>
-          </p:sp>
-        </p:grpSp>
       </p:grpSp>
       <p:sp>
         <p:nvSpPr>
@@ -30555,6 +30404,38 @@
           </a:fontRef>
         </p:style>
       </p:cxnSp>
+      <p:sp>
+        <p:nvSpPr>
+          <p:cNvPr id="9" name="TextBox 8">
+            <a:extLst>
+              <a:ext uri="{FF2B5EF4-FFF2-40B4-BE49-F238E27FC236}">
+                <a16:creationId xmlns:a16="http://schemas.microsoft.com/office/drawing/2014/main" id="{0B8A396F-1FA7-1DBD-B768-78D7C407B7B6}"/>
+              </a:ext>
+            </a:extLst>
+          </p:cNvPr>
+          <p:cNvSpPr txBox="1"/>
+          <p:nvPr/>
+        </p:nvSpPr>
+        <p:spPr>
+          <a:xfrm>
+            <a:off x="3720662" y="2102069"/>
+            <a:ext cx="184731" cy="369332"/>
+          </a:xfrm>
+          <a:prstGeom prst="rect">
+            <a:avLst/>
+          </a:prstGeom>
+          <a:noFill/>
+        </p:spPr>
+        <p:txBody>
+          <a:bodyPr wrap="none" rtlCol="0">
+            <a:spAutoFit/>
+          </a:bodyPr>
+          <a:lstStyle/>
+          <a:p>
+            <a:endParaRPr lang="en-US" dirty="0"/>
+          </a:p>
+        </p:txBody>
+      </p:sp>
     </p:spTree>
     <p:extLst>
       <p:ext uri="{BB962C8B-B14F-4D97-AF65-F5344CB8AC3E}">

</xml_diff>